<commit_message>
Full draft of slides for talk.
</commit_message>
<xml_diff>
--- a/qr15-talk.pptx
+++ b/qr15-talk.pptx
@@ -1,10 +1,16 @@
 
 <file path=ppt/presentation.xml><?xml version="1.0" encoding="utf-8"?>
-<p:presentation xmlns:a="http://schemas.openxmlformats.org/drawingml/2006/main" xmlns:r="http://schemas.openxmlformats.org/officeDocument/2006/relationships" xmlns:p="http://schemas.openxmlformats.org/presentationml/2006/main" saveSubsetFonts="1" autoCompressPictures="0">
+<p:presentation xmlns:a="http://schemas.openxmlformats.org/drawingml/2006/main" xmlns:r="http://schemas.openxmlformats.org/officeDocument/2006/relationships" xmlns:p="http://schemas.openxmlformats.org/presentationml/2006/main" showSpecialPlsOnTitleSld="0" saveSubsetFonts="1" autoCompressPictures="0">
   <p:sldMasterIdLst>
     <p:sldMasterId id="2147483648" r:id="rId1"/>
     <p:sldMasterId id="2147483660" r:id="rId2"/>
   </p:sldMasterIdLst>
+  <p:notesMasterIdLst>
+    <p:notesMasterId r:id="rId22"/>
+  </p:notesMasterIdLst>
+  <p:handoutMasterIdLst>
+    <p:handoutMasterId r:id="rId23"/>
+  </p:handoutMasterIdLst>
   <p:sldIdLst>
     <p:sldId id="261" r:id="rId3"/>
     <p:sldId id="262" r:id="rId4"/>
@@ -22,9 +28,9 @@
     <p:sldId id="272" r:id="rId16"/>
     <p:sldId id="276" r:id="rId17"/>
     <p:sldId id="277" r:id="rId18"/>
-    <p:sldId id="278" r:id="rId19"/>
-    <p:sldId id="273" r:id="rId20"/>
-    <p:sldId id="260" r:id="rId21"/>
+    <p:sldId id="279" r:id="rId19"/>
+    <p:sldId id="278" r:id="rId20"/>
+    <p:sldId id="273" r:id="rId21"/>
   </p:sldIdLst>
   <p:sldSz cx="9144000" cy="6858000" type="screen4x3"/>
   <p:notesSz cx="6858000" cy="9144000"/>
@@ -126,6 +132,643 @@
 </p:presentation>
 </file>
 
+<file path=ppt/handoutMasters/handoutMaster1.xml><?xml version="1.0" encoding="utf-8"?>
+<p:handoutMaster xmlns:a="http://schemas.openxmlformats.org/drawingml/2006/main" xmlns:r="http://schemas.openxmlformats.org/officeDocument/2006/relationships" xmlns:p="http://schemas.openxmlformats.org/presentationml/2006/main">
+  <p:cSld>
+    <p:bg>
+      <p:bgRef idx="1001">
+        <a:schemeClr val="bg1"/>
+      </p:bgRef>
+    </p:bg>
+    <p:spTree>
+      <p:nvGrpSpPr>
+        <p:cNvPr id="1" name=""/>
+        <p:cNvGrpSpPr/>
+        <p:nvPr/>
+      </p:nvGrpSpPr>
+      <p:grpSpPr>
+        <a:xfrm>
+          <a:off x="0" y="0"/>
+          <a:ext cx="0" cy="0"/>
+          <a:chOff x="0" y="0"/>
+          <a:chExt cx="0" cy="0"/>
+        </a:xfrm>
+      </p:grpSpPr>
+      <p:sp>
+        <p:nvSpPr>
+          <p:cNvPr id="2" name="Header Placeholder 1"/>
+          <p:cNvSpPr>
+            <a:spLocks noGrp="1"/>
+          </p:cNvSpPr>
+          <p:nvPr>
+            <p:ph type="hdr" sz="quarter"/>
+          </p:nvPr>
+        </p:nvSpPr>
+        <p:spPr>
+          <a:xfrm>
+            <a:off x="0" y="0"/>
+            <a:ext cx="2971800" cy="457200"/>
+          </a:xfrm>
+          <a:prstGeom prst="rect">
+            <a:avLst/>
+          </a:prstGeom>
+        </p:spPr>
+        <p:txBody>
+          <a:bodyPr vert="horz" lIns="91440" tIns="45720" rIns="91440" bIns="45720" rtlCol="0"/>
+          <a:lstStyle>
+            <a:lvl1pPr algn="l">
+              <a:defRPr sz="1200"/>
+            </a:lvl1pPr>
+          </a:lstStyle>
+          <a:p>
+            <a:endParaRPr lang="en-US"/>
+          </a:p>
+        </p:txBody>
+      </p:sp>
+      <p:sp>
+        <p:nvSpPr>
+          <p:cNvPr id="3" name="Date Placeholder 2"/>
+          <p:cNvSpPr>
+            <a:spLocks noGrp="1"/>
+          </p:cNvSpPr>
+          <p:nvPr>
+            <p:ph type="dt" sz="quarter" idx="1"/>
+          </p:nvPr>
+        </p:nvSpPr>
+        <p:spPr>
+          <a:xfrm>
+            <a:off x="3884613" y="0"/>
+            <a:ext cx="2971800" cy="457200"/>
+          </a:xfrm>
+          <a:prstGeom prst="rect">
+            <a:avLst/>
+          </a:prstGeom>
+        </p:spPr>
+        <p:txBody>
+          <a:bodyPr vert="horz" lIns="91440" tIns="45720" rIns="91440" bIns="45720" rtlCol="0"/>
+          <a:lstStyle>
+            <a:lvl1pPr algn="r">
+              <a:defRPr sz="1200"/>
+            </a:lvl1pPr>
+          </a:lstStyle>
+          <a:p>
+            <a:fld id="{C09238FE-4EB0-4347-A301-FF0CCB517771}" type="datetimeFigureOut">
+              <a:rPr lang="en-US" smtClean="0"/>
+              <a:t>8/9/15</a:t>
+            </a:fld>
+            <a:endParaRPr lang="en-US"/>
+          </a:p>
+        </p:txBody>
+      </p:sp>
+      <p:sp>
+        <p:nvSpPr>
+          <p:cNvPr id="4" name="Footer Placeholder 3"/>
+          <p:cNvSpPr>
+            <a:spLocks noGrp="1"/>
+          </p:cNvSpPr>
+          <p:nvPr>
+            <p:ph type="ftr" sz="quarter" idx="2"/>
+          </p:nvPr>
+        </p:nvSpPr>
+        <p:spPr>
+          <a:xfrm>
+            <a:off x="0" y="8685213"/>
+            <a:ext cx="2971800" cy="457200"/>
+          </a:xfrm>
+          <a:prstGeom prst="rect">
+            <a:avLst/>
+          </a:prstGeom>
+        </p:spPr>
+        <p:txBody>
+          <a:bodyPr vert="horz" lIns="91440" tIns="45720" rIns="91440" bIns="45720" rtlCol="0" anchor="b"/>
+          <a:lstStyle>
+            <a:lvl1pPr algn="l">
+              <a:defRPr sz="1200"/>
+            </a:lvl1pPr>
+          </a:lstStyle>
+          <a:p>
+            <a:endParaRPr lang="en-US"/>
+          </a:p>
+        </p:txBody>
+      </p:sp>
+      <p:sp>
+        <p:nvSpPr>
+          <p:cNvPr id="5" name="Slide Number Placeholder 4"/>
+          <p:cNvSpPr>
+            <a:spLocks noGrp="1"/>
+          </p:cNvSpPr>
+          <p:nvPr>
+            <p:ph type="sldNum" sz="quarter" idx="3"/>
+          </p:nvPr>
+        </p:nvSpPr>
+        <p:spPr>
+          <a:xfrm>
+            <a:off x="3884613" y="8685213"/>
+            <a:ext cx="2971800" cy="457200"/>
+          </a:xfrm>
+          <a:prstGeom prst="rect">
+            <a:avLst/>
+          </a:prstGeom>
+        </p:spPr>
+        <p:txBody>
+          <a:bodyPr vert="horz" lIns="91440" tIns="45720" rIns="91440" bIns="45720" rtlCol="0" anchor="b"/>
+          <a:lstStyle>
+            <a:lvl1pPr algn="r">
+              <a:defRPr sz="1200"/>
+            </a:lvl1pPr>
+          </a:lstStyle>
+          <a:p>
+            <a:fld id="{9529BB12-DE4E-AA48-A5CB-BFFEC0AF5323}" type="slidenum">
+              <a:rPr lang="en-US" smtClean="0"/>
+              <a:t>‹#›</a:t>
+            </a:fld>
+            <a:endParaRPr lang="en-US"/>
+          </a:p>
+        </p:txBody>
+      </p:sp>
+    </p:spTree>
+    <p:extLst>
+      <p:ext uri="{BB962C8B-B14F-4D97-AF65-F5344CB8AC3E}">
+        <p14:creationId xmlns:p14="http://schemas.microsoft.com/office/powerpoint/2010/main" val="3925987879"/>
+      </p:ext>
+    </p:extLst>
+  </p:cSld>
+  <p:clrMap bg1="lt1" tx1="dk1" bg2="lt2" tx2="dk2" accent1="accent1" accent2="accent2" accent3="accent3" accent4="accent4" accent5="accent5" accent6="accent6" hlink="hlink" folHlink="folHlink"/>
+  <p:hf hdr="0" ftr="0" dt="0"/>
+</p:handoutMaster>
+</file>
+
+<file path=ppt/notesMasters/notesMaster1.xml><?xml version="1.0" encoding="utf-8"?>
+<p:notesMaster xmlns:a="http://schemas.openxmlformats.org/drawingml/2006/main" xmlns:r="http://schemas.openxmlformats.org/officeDocument/2006/relationships" xmlns:p="http://schemas.openxmlformats.org/presentationml/2006/main">
+  <p:cSld>
+    <p:bg>
+      <p:bgRef idx="1001">
+        <a:schemeClr val="bg1"/>
+      </p:bgRef>
+    </p:bg>
+    <p:spTree>
+      <p:nvGrpSpPr>
+        <p:cNvPr id="1" name=""/>
+        <p:cNvGrpSpPr/>
+        <p:nvPr/>
+      </p:nvGrpSpPr>
+      <p:grpSpPr>
+        <a:xfrm>
+          <a:off x="0" y="0"/>
+          <a:ext cx="0" cy="0"/>
+          <a:chOff x="0" y="0"/>
+          <a:chExt cx="0" cy="0"/>
+        </a:xfrm>
+      </p:grpSpPr>
+      <p:sp>
+        <p:nvSpPr>
+          <p:cNvPr id="2" name="Header Placeholder 1"/>
+          <p:cNvSpPr>
+            <a:spLocks noGrp="1"/>
+          </p:cNvSpPr>
+          <p:nvPr>
+            <p:ph type="hdr" sz="quarter"/>
+          </p:nvPr>
+        </p:nvSpPr>
+        <p:spPr>
+          <a:xfrm>
+            <a:off x="0" y="0"/>
+            <a:ext cx="2971800" cy="457200"/>
+          </a:xfrm>
+          <a:prstGeom prst="rect">
+            <a:avLst/>
+          </a:prstGeom>
+        </p:spPr>
+        <p:txBody>
+          <a:bodyPr vert="horz" lIns="91440" tIns="45720" rIns="91440" bIns="45720" rtlCol="0"/>
+          <a:lstStyle>
+            <a:lvl1pPr algn="l">
+              <a:defRPr sz="1200"/>
+            </a:lvl1pPr>
+          </a:lstStyle>
+          <a:p>
+            <a:endParaRPr lang="en-US"/>
+          </a:p>
+        </p:txBody>
+      </p:sp>
+      <p:sp>
+        <p:nvSpPr>
+          <p:cNvPr id="3" name="Date Placeholder 2"/>
+          <p:cNvSpPr>
+            <a:spLocks noGrp="1"/>
+          </p:cNvSpPr>
+          <p:nvPr>
+            <p:ph type="dt" idx="1"/>
+          </p:nvPr>
+        </p:nvSpPr>
+        <p:spPr>
+          <a:xfrm>
+            <a:off x="3884613" y="0"/>
+            <a:ext cx="2971800" cy="457200"/>
+          </a:xfrm>
+          <a:prstGeom prst="rect">
+            <a:avLst/>
+          </a:prstGeom>
+        </p:spPr>
+        <p:txBody>
+          <a:bodyPr vert="horz" lIns="91440" tIns="45720" rIns="91440" bIns="45720" rtlCol="0"/>
+          <a:lstStyle>
+            <a:lvl1pPr algn="r">
+              <a:defRPr sz="1200"/>
+            </a:lvl1pPr>
+          </a:lstStyle>
+          <a:p>
+            <a:fld id="{BD5B5157-9CFF-B443-A51D-28EA964DD685}" type="datetimeFigureOut">
+              <a:rPr lang="en-US" smtClean="0"/>
+              <a:t>8/9/15</a:t>
+            </a:fld>
+            <a:endParaRPr lang="en-US"/>
+          </a:p>
+        </p:txBody>
+      </p:sp>
+      <p:sp>
+        <p:nvSpPr>
+          <p:cNvPr id="4" name="Slide Image Placeholder 3"/>
+          <p:cNvSpPr>
+            <a:spLocks noGrp="1" noRot="1" noChangeAspect="1"/>
+          </p:cNvSpPr>
+          <p:nvPr>
+            <p:ph type="sldImg" idx="2"/>
+          </p:nvPr>
+        </p:nvSpPr>
+        <p:spPr>
+          <a:xfrm>
+            <a:off x="1143000" y="685800"/>
+            <a:ext cx="4572000" cy="3429000"/>
+          </a:xfrm>
+          <a:prstGeom prst="rect">
+            <a:avLst/>
+          </a:prstGeom>
+          <a:noFill/>
+          <a:ln w="12700">
+            <a:solidFill>
+              <a:prstClr val="black"/>
+            </a:solidFill>
+          </a:ln>
+        </p:spPr>
+        <p:txBody>
+          <a:bodyPr vert="horz" lIns="91440" tIns="45720" rIns="91440" bIns="45720" rtlCol="0" anchor="ctr"/>
+          <a:lstStyle/>
+          <a:p>
+            <a:endParaRPr lang="en-US"/>
+          </a:p>
+        </p:txBody>
+      </p:sp>
+      <p:sp>
+        <p:nvSpPr>
+          <p:cNvPr id="5" name="Notes Placeholder 4"/>
+          <p:cNvSpPr>
+            <a:spLocks noGrp="1"/>
+          </p:cNvSpPr>
+          <p:nvPr>
+            <p:ph type="body" sz="quarter" idx="3"/>
+          </p:nvPr>
+        </p:nvSpPr>
+        <p:spPr>
+          <a:xfrm>
+            <a:off x="685800" y="4343400"/>
+            <a:ext cx="5486400" cy="4114800"/>
+          </a:xfrm>
+          <a:prstGeom prst="rect">
+            <a:avLst/>
+          </a:prstGeom>
+        </p:spPr>
+        <p:txBody>
+          <a:bodyPr vert="horz" lIns="91440" tIns="45720" rIns="91440" bIns="45720" rtlCol="0"/>
+          <a:lstStyle/>
+          <a:p>
+            <a:pPr lvl="0"/>
+            <a:r>
+              <a:rPr lang="en-US" smtClean="0"/>
+              <a:t>Click to edit Master text styles</a:t>
+            </a:r>
+          </a:p>
+          <a:p>
+            <a:pPr lvl="1"/>
+            <a:r>
+              <a:rPr lang="en-US" smtClean="0"/>
+              <a:t>Second level</a:t>
+            </a:r>
+          </a:p>
+          <a:p>
+            <a:pPr lvl="2"/>
+            <a:r>
+              <a:rPr lang="en-US" smtClean="0"/>
+              <a:t>Third level</a:t>
+            </a:r>
+          </a:p>
+          <a:p>
+            <a:pPr lvl="3"/>
+            <a:r>
+              <a:rPr lang="en-US" smtClean="0"/>
+              <a:t>Fourth level</a:t>
+            </a:r>
+          </a:p>
+          <a:p>
+            <a:pPr lvl="4"/>
+            <a:r>
+              <a:rPr lang="en-US" smtClean="0"/>
+              <a:t>Fifth level</a:t>
+            </a:r>
+            <a:endParaRPr lang="en-US"/>
+          </a:p>
+        </p:txBody>
+      </p:sp>
+      <p:sp>
+        <p:nvSpPr>
+          <p:cNvPr id="6" name="Footer Placeholder 5"/>
+          <p:cNvSpPr>
+            <a:spLocks noGrp="1"/>
+          </p:cNvSpPr>
+          <p:nvPr>
+            <p:ph type="ftr" sz="quarter" idx="4"/>
+          </p:nvPr>
+        </p:nvSpPr>
+        <p:spPr>
+          <a:xfrm>
+            <a:off x="0" y="8685213"/>
+            <a:ext cx="2971800" cy="457200"/>
+          </a:xfrm>
+          <a:prstGeom prst="rect">
+            <a:avLst/>
+          </a:prstGeom>
+        </p:spPr>
+        <p:txBody>
+          <a:bodyPr vert="horz" lIns="91440" tIns="45720" rIns="91440" bIns="45720" rtlCol="0" anchor="b"/>
+          <a:lstStyle>
+            <a:lvl1pPr algn="l">
+              <a:defRPr sz="1200"/>
+            </a:lvl1pPr>
+          </a:lstStyle>
+          <a:p>
+            <a:endParaRPr lang="en-US"/>
+          </a:p>
+        </p:txBody>
+      </p:sp>
+      <p:sp>
+        <p:nvSpPr>
+          <p:cNvPr id="7" name="Slide Number Placeholder 6"/>
+          <p:cNvSpPr>
+            <a:spLocks noGrp="1"/>
+          </p:cNvSpPr>
+          <p:nvPr>
+            <p:ph type="sldNum" sz="quarter" idx="5"/>
+          </p:nvPr>
+        </p:nvSpPr>
+        <p:spPr>
+          <a:xfrm>
+            <a:off x="3884613" y="8685213"/>
+            <a:ext cx="2971800" cy="457200"/>
+          </a:xfrm>
+          <a:prstGeom prst="rect">
+            <a:avLst/>
+          </a:prstGeom>
+        </p:spPr>
+        <p:txBody>
+          <a:bodyPr vert="horz" lIns="91440" tIns="45720" rIns="91440" bIns="45720" rtlCol="0" anchor="b"/>
+          <a:lstStyle>
+            <a:lvl1pPr algn="r">
+              <a:defRPr sz="1200"/>
+            </a:lvl1pPr>
+          </a:lstStyle>
+          <a:p>
+            <a:fld id="{4F2E9D2D-FF33-5041-A605-49FF075131DE}" type="slidenum">
+              <a:rPr lang="en-US" smtClean="0"/>
+              <a:t>‹#›</a:t>
+            </a:fld>
+            <a:endParaRPr lang="en-US"/>
+          </a:p>
+        </p:txBody>
+      </p:sp>
+    </p:spTree>
+    <p:extLst>
+      <p:ext uri="{BB962C8B-B14F-4D97-AF65-F5344CB8AC3E}">
+        <p14:creationId xmlns:p14="http://schemas.microsoft.com/office/powerpoint/2010/main" val="1949516024"/>
+      </p:ext>
+    </p:extLst>
+  </p:cSld>
+  <p:clrMap bg1="lt1" tx1="dk1" bg2="lt2" tx2="dk2" accent1="accent1" accent2="accent2" accent3="accent3" accent4="accent4" accent5="accent5" accent6="accent6" hlink="hlink" folHlink="folHlink"/>
+  <p:hf hdr="0" ftr="0" dt="0"/>
+  <p:notesStyle>
+    <a:lvl1pPr marL="0" algn="l" defTabSz="457200" rtl="0" eaLnBrk="1" latinLnBrk="0" hangingPunct="1">
+      <a:defRPr sz="1200" kern="1200">
+        <a:solidFill>
+          <a:schemeClr val="tx1"/>
+        </a:solidFill>
+        <a:latin typeface="+mn-lt"/>
+        <a:ea typeface="+mn-ea"/>
+        <a:cs typeface="+mn-cs"/>
+      </a:defRPr>
+    </a:lvl1pPr>
+    <a:lvl2pPr marL="457200" algn="l" defTabSz="457200" rtl="0" eaLnBrk="1" latinLnBrk="0" hangingPunct="1">
+      <a:defRPr sz="1200" kern="1200">
+        <a:solidFill>
+          <a:schemeClr val="tx1"/>
+        </a:solidFill>
+        <a:latin typeface="+mn-lt"/>
+        <a:ea typeface="+mn-ea"/>
+        <a:cs typeface="+mn-cs"/>
+      </a:defRPr>
+    </a:lvl2pPr>
+    <a:lvl3pPr marL="914400" algn="l" defTabSz="457200" rtl="0" eaLnBrk="1" latinLnBrk="0" hangingPunct="1">
+      <a:defRPr sz="1200" kern="1200">
+        <a:solidFill>
+          <a:schemeClr val="tx1"/>
+        </a:solidFill>
+        <a:latin typeface="+mn-lt"/>
+        <a:ea typeface="+mn-ea"/>
+        <a:cs typeface="+mn-cs"/>
+      </a:defRPr>
+    </a:lvl3pPr>
+    <a:lvl4pPr marL="1371600" algn="l" defTabSz="457200" rtl="0" eaLnBrk="1" latinLnBrk="0" hangingPunct="1">
+      <a:defRPr sz="1200" kern="1200">
+        <a:solidFill>
+          <a:schemeClr val="tx1"/>
+        </a:solidFill>
+        <a:latin typeface="+mn-lt"/>
+        <a:ea typeface="+mn-ea"/>
+        <a:cs typeface="+mn-cs"/>
+      </a:defRPr>
+    </a:lvl4pPr>
+    <a:lvl5pPr marL="1828800" algn="l" defTabSz="457200" rtl="0" eaLnBrk="1" latinLnBrk="0" hangingPunct="1">
+      <a:defRPr sz="1200" kern="1200">
+        <a:solidFill>
+          <a:schemeClr val="tx1"/>
+        </a:solidFill>
+        <a:latin typeface="+mn-lt"/>
+        <a:ea typeface="+mn-ea"/>
+        <a:cs typeface="+mn-cs"/>
+      </a:defRPr>
+    </a:lvl5pPr>
+    <a:lvl6pPr marL="2286000" algn="l" defTabSz="457200" rtl="0" eaLnBrk="1" latinLnBrk="0" hangingPunct="1">
+      <a:defRPr sz="1200" kern="1200">
+        <a:solidFill>
+          <a:schemeClr val="tx1"/>
+        </a:solidFill>
+        <a:latin typeface="+mn-lt"/>
+        <a:ea typeface="+mn-ea"/>
+        <a:cs typeface="+mn-cs"/>
+      </a:defRPr>
+    </a:lvl6pPr>
+    <a:lvl7pPr marL="2743200" algn="l" defTabSz="457200" rtl="0" eaLnBrk="1" latinLnBrk="0" hangingPunct="1">
+      <a:defRPr sz="1200" kern="1200">
+        <a:solidFill>
+          <a:schemeClr val="tx1"/>
+        </a:solidFill>
+        <a:latin typeface="+mn-lt"/>
+        <a:ea typeface="+mn-ea"/>
+        <a:cs typeface="+mn-cs"/>
+      </a:defRPr>
+    </a:lvl7pPr>
+    <a:lvl8pPr marL="3200400" algn="l" defTabSz="457200" rtl="0" eaLnBrk="1" latinLnBrk="0" hangingPunct="1">
+      <a:defRPr sz="1200" kern="1200">
+        <a:solidFill>
+          <a:schemeClr val="tx1"/>
+        </a:solidFill>
+        <a:latin typeface="+mn-lt"/>
+        <a:ea typeface="+mn-ea"/>
+        <a:cs typeface="+mn-cs"/>
+      </a:defRPr>
+    </a:lvl8pPr>
+    <a:lvl9pPr marL="3657600" algn="l" defTabSz="457200" rtl="0" eaLnBrk="1" latinLnBrk="0" hangingPunct="1">
+      <a:defRPr sz="1200" kern="1200">
+        <a:solidFill>
+          <a:schemeClr val="tx1"/>
+        </a:solidFill>
+        <a:latin typeface="+mn-lt"/>
+        <a:ea typeface="+mn-ea"/>
+        <a:cs typeface="+mn-cs"/>
+      </a:defRPr>
+    </a:lvl9pPr>
+  </p:notesStyle>
+</p:notesMaster>
+</file>
+
+<file path=ppt/notesSlides/notesSlide1.xml><?xml version="1.0" encoding="utf-8"?>
+<p:notes xmlns:a="http://schemas.openxmlformats.org/drawingml/2006/main" xmlns:r="http://schemas.openxmlformats.org/officeDocument/2006/relationships" xmlns:p="http://schemas.openxmlformats.org/presentationml/2006/main">
+  <p:cSld>
+    <p:spTree>
+      <p:nvGrpSpPr>
+        <p:cNvPr id="1" name=""/>
+        <p:cNvGrpSpPr/>
+        <p:nvPr/>
+      </p:nvGrpSpPr>
+      <p:grpSpPr>
+        <a:xfrm>
+          <a:off x="0" y="0"/>
+          <a:ext cx="0" cy="0"/>
+          <a:chOff x="0" y="0"/>
+          <a:chExt cx="0" cy="0"/>
+        </a:xfrm>
+      </p:grpSpPr>
+      <p:sp>
+        <p:nvSpPr>
+          <p:cNvPr id="2" name="Slide Image Placeholder 1"/>
+          <p:cNvSpPr>
+            <a:spLocks noGrp="1" noRot="1" noChangeAspect="1"/>
+          </p:cNvSpPr>
+          <p:nvPr>
+            <p:ph type="sldImg"/>
+          </p:nvPr>
+        </p:nvSpPr>
+        <p:spPr/>
+      </p:sp>
+      <p:sp>
+        <p:nvSpPr>
+          <p:cNvPr id="3" name="Notes Placeholder 2"/>
+          <p:cNvSpPr>
+            <a:spLocks noGrp="1"/>
+          </p:cNvSpPr>
+          <p:nvPr>
+            <p:ph type="body" idx="1"/>
+          </p:nvPr>
+        </p:nvSpPr>
+        <p:spPr/>
+        <p:txBody>
+          <a:bodyPr/>
+          <a:lstStyle/>
+          <a:p>
+            <a:r>
+              <a:rPr lang="en-US" i="1" dirty="0" smtClean="0"/>
+              <a:t>X </a:t>
+            </a:r>
+            <a:r>
+              <a:rPr lang="en-US" i="0" dirty="0" smtClean="0"/>
+              <a:t>axis</a:t>
+            </a:r>
+            <a:r>
+              <a:rPr lang="en-US" i="0" baseline="0" dirty="0" smtClean="0"/>
+              <a:t> is the false positive rate/sensor; </a:t>
+            </a:r>
+            <a:r>
+              <a:rPr lang="en-US" i="1" baseline="0" dirty="0" smtClean="0"/>
+              <a:t>Y </a:t>
+            </a:r>
+            <a:r>
+              <a:rPr lang="en-US" i="0" baseline="0" dirty="0" smtClean="0"/>
+              <a:t>is the rarity, and </a:t>
+            </a:r>
+            <a:r>
+              <a:rPr lang="en-US" i="1" baseline="0" dirty="0" smtClean="0"/>
+              <a:t>Z </a:t>
+            </a:r>
+            <a:r>
+              <a:rPr lang="en-US" i="0" baseline="0" dirty="0" smtClean="0"/>
+              <a:t>is P(no </a:t>
+            </a:r>
+            <a:r>
+              <a:rPr lang="en-US" i="0" baseline="0" dirty="0" err="1" smtClean="0"/>
+              <a:t>attack|n</a:t>
+            </a:r>
+            <a:r>
+              <a:rPr lang="en-US" i="0" baseline="0" dirty="0" smtClean="0"/>
+              <a:t> alarms)</a:t>
+            </a:r>
+            <a:endParaRPr lang="en-US" i="1" dirty="0"/>
+          </a:p>
+        </p:txBody>
+      </p:sp>
+      <p:sp>
+        <p:nvSpPr>
+          <p:cNvPr id="4" name="Slide Number Placeholder 3"/>
+          <p:cNvSpPr>
+            <a:spLocks noGrp="1"/>
+          </p:cNvSpPr>
+          <p:nvPr>
+            <p:ph type="sldNum" sz="quarter" idx="10"/>
+          </p:nvPr>
+        </p:nvSpPr>
+        <p:spPr/>
+        <p:txBody>
+          <a:bodyPr/>
+          <a:lstStyle/>
+          <a:p>
+            <a:fld id="{4F2E9D2D-FF33-5041-A605-49FF075131DE}" type="slidenum">
+              <a:rPr lang="en-US" smtClean="0"/>
+              <a:t>17</a:t>
+            </a:fld>
+            <a:endParaRPr lang="en-US"/>
+          </a:p>
+        </p:txBody>
+      </p:sp>
+    </p:spTree>
+    <p:extLst>
+      <p:ext uri="{BB962C8B-B14F-4D97-AF65-F5344CB8AC3E}">
+        <p14:creationId xmlns:p14="http://schemas.microsoft.com/office/powerpoint/2010/main" val="864409534"/>
+      </p:ext>
+    </p:extLst>
+  </p:cSld>
+  <p:clrMapOvr>
+    <a:masterClrMapping/>
+  </p:clrMapOvr>
+</p:notes>
+</file>
+
 <file path=ppt/slideLayouts/slideLayout1.xml><?xml version="1.0" encoding="utf-8"?>
 <p:sldLayout xmlns:a="http://schemas.openxmlformats.org/drawingml/2006/main" xmlns:r="http://schemas.openxmlformats.org/officeDocument/2006/relationships" xmlns:p="http://schemas.openxmlformats.org/presentationml/2006/main" type="title" preserve="1">
   <p:cSld name="Title Slide">
@@ -305,7 +948,7 @@
           <a:bodyPr/>
           <a:lstStyle/>
           <a:p>
-            <a:fld id="{21EA0AE6-92B9-3142-A66F-5B83E0728E5A}" type="datetimeFigureOut">
+            <a:fld id="{63CCA9B8-D412-8549-AF3D-AECF80BB60AC}" type="datetime1">
               <a:rPr lang="en-US" smtClean="0"/>
               <a:t>8/9/15</a:t>
             </a:fld>
@@ -475,7 +1118,7 @@
           <a:bodyPr/>
           <a:lstStyle/>
           <a:p>
-            <a:fld id="{21EA0AE6-92B9-3142-A66F-5B83E0728E5A}" type="datetimeFigureOut">
+            <a:fld id="{BA9663AF-C259-2348-9625-AC2078E08AB8}" type="datetime1">
               <a:rPr lang="en-US" smtClean="0"/>
               <a:t>8/9/15</a:t>
             </a:fld>
@@ -655,7 +1298,7 @@
           <a:bodyPr/>
           <a:lstStyle/>
           <a:p>
-            <a:fld id="{21EA0AE6-92B9-3142-A66F-5B83E0728E5A}" type="datetimeFigureOut">
+            <a:fld id="{8D234C4E-4594-4B41-B873-DC2545893207}" type="datetime1">
               <a:rPr lang="en-US" smtClean="0"/>
               <a:t>8/9/15</a:t>
             </a:fld>
@@ -735,79 +1378,13 @@
           <a:chExt cx="0" cy="0"/>
         </a:xfrm>
       </p:grpSpPr>
-      <p:pic>
-        <p:nvPicPr>
-          <p:cNvPr id="40009" name="Picture 73"/>
-          <p:cNvPicPr>
-            <a:picLocks noChangeAspect="1" noChangeArrowheads="1"/>
-          </p:cNvPicPr>
-          <p:nvPr/>
-        </p:nvPicPr>
-        <p:blipFill>
-          <a:blip r:embed="rId2">
-            <a:extLst>
-              <a:ext uri="{28A0092B-C50C-407E-A947-70E740481C1C}">
-                <a14:useLocalDpi xmlns:a14="http://schemas.microsoft.com/office/drawing/2010/main" val="0"/>
-              </a:ext>
-            </a:extLst>
-          </a:blip>
-          <a:srcRect/>
-          <a:stretch>
-            <a:fillRect/>
-          </a:stretch>
-        </p:blipFill>
-        <p:spPr bwMode="auto">
-          <a:xfrm>
-            <a:off x="0" y="0"/>
-            <a:ext cx="9150350" cy="6889750"/>
-          </a:xfrm>
-          <a:prstGeom prst="rect">
-            <a:avLst/>
-          </a:prstGeom>
-          <a:noFill/>
-          <a:ln>
-            <a:noFill/>
-          </a:ln>
-          <a:effectLst/>
-          <a:extLst>
-            <a:ext uri="{909E8E84-426E-40dd-AFC4-6F175D3DCCD1}">
-              <a14:hiddenFill xmlns:a14="http://schemas.microsoft.com/office/drawing/2010/main">
-                <a:solidFill>
-                  <a:schemeClr val="accent1"/>
-                </a:solidFill>
-              </a14:hiddenFill>
-            </a:ext>
-            <a:ext uri="{91240B29-F687-4f45-9708-019B960494DF}">
-              <a14:hiddenLine xmlns:a14="http://schemas.microsoft.com/office/drawing/2010/main" w="12700">
-                <a:solidFill>
-                  <a:schemeClr val="tx1"/>
-                </a:solidFill>
-                <a:miter lim="800000"/>
-                <a:headEnd type="none" w="sm" len="sm"/>
-                <a:tailEnd type="none" w="sm" len="sm"/>
-              </a14:hiddenLine>
-            </a:ext>
-            <a:ext uri="{AF507438-7753-43e0-B8FC-AC1667EBCBE1}">
-              <a14:hiddenEffects xmlns:a14="http://schemas.microsoft.com/office/drawing/2010/main">
-                <a:effectLst>
-                  <a:outerShdw blurRad="63500" dist="38099" dir="2700000" algn="ctr" rotWithShape="0">
-                    <a:schemeClr val="bg2">
-                      <a:alpha val="74998"/>
-                    </a:schemeClr>
-                  </a:outerShdw>
-                </a:effectLst>
-              </a14:hiddenEffects>
-            </a:ext>
-          </a:extLst>
-        </p:spPr>
-      </p:pic>
       <p:grpSp>
         <p:nvGrpSpPr>
           <p:cNvPr id="39940" name="Group 4"/>
           <p:cNvGrpSpPr>
             <a:grpSpLocks/>
           </p:cNvGrpSpPr>
-          <p:nvPr/>
+          <p:nvPr userDrawn="1"/>
         </p:nvGrpSpPr>
         <p:grpSpPr bwMode="auto">
           <a:xfrm>
@@ -4218,6 +4795,10 @@
             </a:lvl1pPr>
           </a:lstStyle>
           <a:p>
+            <a:fld id="{E2BA537B-5EF0-EE46-A8C3-8C9476A114F7}" type="datetime1">
+              <a:rPr lang="en-US" smtClean="0"/>
+              <a:t>8/9/15</a:t>
+            </a:fld>
             <a:endParaRPr lang="en-US"/>
           </a:p>
         </p:txBody>
@@ -4292,7 +4873,7 @@
           <p:nvPr/>
         </p:nvPicPr>
         <p:blipFill>
-          <a:blip r:embed="rId3">
+          <a:blip r:embed="rId2">
             <a:extLst>
               <a:ext uri="{28A0092B-C50C-407E-A947-70E740481C1C}">
                 <a14:useLocalDpi xmlns:a14="http://schemas.microsoft.com/office/drawing/2010/main" val="0"/>
@@ -4308,47 +4889,6 @@
           <a:xfrm>
             <a:off x="0" y="0"/>
             <a:ext cx="1268413" cy="1600200"/>
-          </a:xfrm>
-          <a:prstGeom prst="rect">
-            <a:avLst/>
-          </a:prstGeom>
-          <a:noFill/>
-          <a:extLst>
-            <a:ext uri="{909E8E84-426E-40dd-AFC4-6F175D3DCCD1}">
-              <a14:hiddenFill xmlns:a14="http://schemas.microsoft.com/office/drawing/2010/main">
-                <a:solidFill>
-                  <a:srgbClr val="FFFFFF"/>
-                </a:solidFill>
-              </a14:hiddenFill>
-            </a:ext>
-          </a:extLst>
-        </p:spPr>
-      </p:pic>
-      <p:pic>
-        <p:nvPicPr>
-          <p:cNvPr id="40008" name="Picture 72" descr="C:\Documents and Settings\hfunk\My Documents\SIFT\Graphics\logos\Current\sift_banner.jpg"/>
-          <p:cNvPicPr>
-            <a:picLocks noChangeAspect="1" noChangeArrowheads="1"/>
-          </p:cNvPicPr>
-          <p:nvPr/>
-        </p:nvPicPr>
-        <p:blipFill>
-          <a:blip r:embed="rId4">
-            <a:extLst>
-              <a:ext uri="{28A0092B-C50C-407E-A947-70E740481C1C}">
-                <a14:useLocalDpi xmlns:a14="http://schemas.microsoft.com/office/drawing/2010/main" val="0"/>
-              </a:ext>
-            </a:extLst>
-          </a:blip>
-          <a:srcRect/>
-          <a:stretch>
-            <a:fillRect/>
-          </a:stretch>
-        </p:blipFill>
-        <p:spPr bwMode="auto">
-          <a:xfrm>
-            <a:off x="3162300" y="5907088"/>
-            <a:ext cx="2806700" cy="342900"/>
           </a:xfrm>
           <a:prstGeom prst="rect">
             <a:avLst/>
@@ -4578,10 +5118,9 @@
             </a:lvl1pPr>
           </a:lstStyle>
           <a:p>
-            <a:fld id="{0B328906-6665-6141-9B6E-63143F127B07}" type="datetime3">
-              <a:rPr lang="en-US"/>
-              <a:pPr/>
-              <a:t>9 August 2015</a:t>
+            <a:fld id="{055FAB7D-1CDE-6448-96CA-741062821557}" type="datetime1">
+              <a:rPr lang="en-US" smtClean="0"/>
+              <a:t>8/9/15</a:t>
             </a:fld>
             <a:endParaRPr lang="en-US"/>
           </a:p>
@@ -4784,10 +5323,9 @@
             </a:lvl1pPr>
           </a:lstStyle>
           <a:p>
-            <a:fld id="{0B328906-6665-6141-9B6E-63143F127B07}" type="datetime3">
-              <a:rPr lang="en-US"/>
-              <a:pPr/>
-              <a:t>9 August 2015</a:t>
+            <a:fld id="{BDD6CFF8-F8CB-6342-8B9F-EDCF94551ADC}" type="datetime1">
+              <a:rPr lang="en-US" smtClean="0"/>
+              <a:t>8/9/15</a:t>
             </a:fld>
             <a:endParaRPr lang="en-US"/>
           </a:p>
@@ -5086,10 +5624,9 @@
             </a:lvl1pPr>
           </a:lstStyle>
           <a:p>
-            <a:fld id="{0B328906-6665-6141-9B6E-63143F127B07}" type="datetime3">
-              <a:rPr lang="en-US"/>
-              <a:pPr/>
-              <a:t>9 August 2015</a:t>
+            <a:fld id="{F2609DE0-FAF9-A74C-8121-E47529BD33EA}" type="datetime1">
+              <a:rPr lang="en-US" smtClean="0"/>
+              <a:t>8/9/15</a:t>
             </a:fld>
             <a:endParaRPr lang="en-US"/>
           </a:p>
@@ -5527,10 +6064,9 @@
             </a:lvl1pPr>
           </a:lstStyle>
           <a:p>
-            <a:fld id="{0B328906-6665-6141-9B6E-63143F127B07}" type="datetime3">
-              <a:rPr lang="en-US"/>
-              <a:pPr/>
-              <a:t>9 August 2015</a:t>
+            <a:fld id="{D153ED22-53A4-004E-835C-A4B23833DFAA}" type="datetime1">
+              <a:rPr lang="en-US" smtClean="0"/>
+              <a:t>8/9/15</a:t>
             </a:fld>
             <a:endParaRPr lang="en-US"/>
           </a:p>
@@ -5659,10 +6195,9 @@
             </a:lvl1pPr>
           </a:lstStyle>
           <a:p>
-            <a:fld id="{0B328906-6665-6141-9B6E-63143F127B07}" type="datetime3">
-              <a:rPr lang="en-US"/>
-              <a:pPr/>
-              <a:t>9 August 2015</a:t>
+            <a:fld id="{4500F682-9920-7947-8BC2-6481D76A2CBF}" type="datetime1">
+              <a:rPr lang="en-US" smtClean="0"/>
+              <a:t>8/9/15</a:t>
             </a:fld>
             <a:endParaRPr lang="en-US"/>
           </a:p>
@@ -5768,10 +6303,9 @@
             </a:lvl1pPr>
           </a:lstStyle>
           <a:p>
-            <a:fld id="{0B328906-6665-6141-9B6E-63143F127B07}" type="datetime3">
-              <a:rPr lang="en-US"/>
-              <a:pPr/>
-              <a:t>9 August 2015</a:t>
+            <a:fld id="{E3A07CE2-82FF-A244-9E76-CA0853E6D3A4}" type="datetime1">
+              <a:rPr lang="en-US" smtClean="0"/>
+              <a:t>8/9/15</a:t>
             </a:fld>
             <a:endParaRPr lang="en-US"/>
           </a:p>
@@ -6059,10 +6593,9 @@
             </a:lvl1pPr>
           </a:lstStyle>
           <a:p>
-            <a:fld id="{0B328906-6665-6141-9B6E-63143F127B07}" type="datetime3">
-              <a:rPr lang="en-US"/>
-              <a:pPr/>
-              <a:t>9 August 2015</a:t>
+            <a:fld id="{1E316B36-35C7-6D4F-AC6D-C50E30529065}" type="datetime1">
+              <a:rPr lang="en-US" smtClean="0"/>
+              <a:t>8/9/15</a:t>
             </a:fld>
             <a:endParaRPr lang="en-US"/>
           </a:p>
@@ -6239,7 +6772,7 @@
           <a:bodyPr/>
           <a:lstStyle/>
           <a:p>
-            <a:fld id="{21EA0AE6-92B9-3142-A66F-5B83E0728E5A}" type="datetimeFigureOut">
+            <a:fld id="{958A0AB1-E703-E042-A887-8C816DCA24F0}" type="datetime1">
               <a:rPr lang="en-US" smtClean="0"/>
               <a:t>8/9/15</a:t>
             </a:fld>
@@ -6496,10 +7029,9 @@
             </a:lvl1pPr>
           </a:lstStyle>
           <a:p>
-            <a:fld id="{0B328906-6665-6141-9B6E-63143F127B07}" type="datetime3">
-              <a:rPr lang="en-US"/>
-              <a:pPr/>
-              <a:t>9 August 2015</a:t>
+            <a:fld id="{F2452EE8-7E93-4B40-819F-7FA071490A85}" type="datetime1">
+              <a:rPr lang="en-US" smtClean="0"/>
+              <a:t>8/9/15</a:t>
             </a:fld>
             <a:endParaRPr lang="en-US"/>
           </a:p>
@@ -6680,10 +7212,9 @@
             </a:lvl1pPr>
           </a:lstStyle>
           <a:p>
-            <a:fld id="{0B328906-6665-6141-9B6E-63143F127B07}" type="datetime3">
-              <a:rPr lang="en-US"/>
-              <a:pPr/>
-              <a:t>9 August 2015</a:t>
+            <a:fld id="{22A157EC-B6F8-BD46-90C8-8D6D443EFFE5}" type="datetime1">
+              <a:rPr lang="en-US" smtClean="0"/>
+              <a:t>8/9/15</a:t>
             </a:fld>
             <a:endParaRPr lang="en-US"/>
           </a:p>
@@ -6874,10 +7405,9 @@
             </a:lvl1pPr>
           </a:lstStyle>
           <a:p>
-            <a:fld id="{0B328906-6665-6141-9B6E-63143F127B07}" type="datetime3">
-              <a:rPr lang="en-US"/>
-              <a:pPr/>
-              <a:t>9 August 2015</a:t>
+            <a:fld id="{C0E42BFF-FBC9-FE43-BB6D-D5D194F44335}" type="datetime1">
+              <a:rPr lang="en-US" smtClean="0"/>
+              <a:t>8/9/15</a:t>
             </a:fld>
             <a:endParaRPr lang="en-US"/>
           </a:p>
@@ -7130,7 +7660,7 @@
           <a:bodyPr/>
           <a:lstStyle/>
           <a:p>
-            <a:fld id="{21EA0AE6-92B9-3142-A66F-5B83E0728E5A}" type="datetimeFigureOut">
+            <a:fld id="{FC966084-DF38-1F4A-8353-B9134D44659E}" type="datetime1">
               <a:rPr lang="en-US" smtClean="0"/>
               <a:t>8/9/15</a:t>
             </a:fld>
@@ -7418,7 +7948,7 @@
           <a:bodyPr/>
           <a:lstStyle/>
           <a:p>
-            <a:fld id="{21EA0AE6-92B9-3142-A66F-5B83E0728E5A}" type="datetimeFigureOut">
+            <a:fld id="{699E0828-522D-E748-B9E1-D09877EF5A22}" type="datetime1">
               <a:rPr lang="en-US" smtClean="0"/>
               <a:t>8/9/15</a:t>
             </a:fld>
@@ -7840,7 +8370,7 @@
           <a:bodyPr/>
           <a:lstStyle/>
           <a:p>
-            <a:fld id="{21EA0AE6-92B9-3142-A66F-5B83E0728E5A}" type="datetimeFigureOut">
+            <a:fld id="{B548F937-A98B-254B-BFA3-CED16576B114}" type="datetime1">
               <a:rPr lang="en-US" smtClean="0"/>
               <a:t>8/9/15</a:t>
             </a:fld>
@@ -7958,7 +8488,7 @@
           <a:bodyPr/>
           <a:lstStyle/>
           <a:p>
-            <a:fld id="{21EA0AE6-92B9-3142-A66F-5B83E0728E5A}" type="datetimeFigureOut">
+            <a:fld id="{6264E704-6DA6-6D49-AC19-9F73C8A6E5AF}" type="datetime1">
               <a:rPr lang="en-US" smtClean="0"/>
               <a:t>8/9/15</a:t>
             </a:fld>
@@ -8053,7 +8583,7 @@
           <a:bodyPr/>
           <a:lstStyle/>
           <a:p>
-            <a:fld id="{21EA0AE6-92B9-3142-A66F-5B83E0728E5A}" type="datetimeFigureOut">
+            <a:fld id="{03EAAD57-D17C-8D4B-BCBE-1F55296471D2}" type="datetime1">
               <a:rPr lang="en-US" smtClean="0"/>
               <a:t>8/9/15</a:t>
             </a:fld>
@@ -8330,7 +8860,7 @@
           <a:bodyPr/>
           <a:lstStyle/>
           <a:p>
-            <a:fld id="{21EA0AE6-92B9-3142-A66F-5B83E0728E5A}" type="datetimeFigureOut">
+            <a:fld id="{FE654D92-DE40-484A-B193-29D7AB063B43}" type="datetime1">
               <a:rPr lang="en-US" smtClean="0"/>
               <a:t>8/9/15</a:t>
             </a:fld>
@@ -8583,7 +9113,7 @@
           <a:bodyPr/>
           <a:lstStyle/>
           <a:p>
-            <a:fld id="{21EA0AE6-92B9-3142-A66F-5B83E0728E5A}" type="datetimeFigureOut">
+            <a:fld id="{B14A2CC6-93F0-F148-8D20-99D678EE69DD}" type="datetime1">
               <a:rPr lang="en-US" smtClean="0"/>
               <a:t>8/9/15</a:t>
             </a:fld>
@@ -8796,7 +9326,7 @@
             </a:lvl1pPr>
           </a:lstStyle>
           <a:p>
-            <a:fld id="{21EA0AE6-92B9-3142-A66F-5B83E0728E5A}" type="datetimeFigureOut">
+            <a:fld id="{ADFD5156-B395-4446-A648-5A18F2B7D2D8}" type="datetime1">
               <a:rPr lang="en-US" smtClean="0"/>
               <a:t>8/9/15</a:t>
             </a:fld>
@@ -8903,6 +9433,7 @@
     <p:sldLayoutId id="2147483658" r:id="rId10"/>
     <p:sldLayoutId id="2147483659" r:id="rId11"/>
   </p:sldLayoutIdLst>
+  <p:hf sldNum="0" hdr="0" ftr="0" dt="0"/>
   <p:txStyles>
     <p:titleStyle>
       <a:lvl1pPr algn="ctr" defTabSz="457200" rtl="0" eaLnBrk="1" latinLnBrk="0" hangingPunct="1">
@@ -9418,10 +9949,9 @@
             </a:lvl1pPr>
           </a:lstStyle>
           <a:p>
-            <a:fld id="{0B328906-6665-6141-9B6E-63143F127B07}" type="datetime3">
-              <a:rPr lang="en-US"/>
-              <a:pPr/>
-              <a:t>9 August 2015</a:t>
+            <a:fld id="{7C6F3EFD-CF33-674E-B9A7-B8E8BB0FB1FA}" type="datetime1">
+              <a:rPr lang="en-US" smtClean="0"/>
+              <a:t>8/9/15</a:t>
             </a:fld>
             <a:endParaRPr lang="en-US"/>
           </a:p>
@@ -10282,7 +10812,7 @@
     <p:sldLayoutId id="2147483670" r:id="rId10"/>
     <p:sldLayoutId id="2147483671" r:id="rId11"/>
   </p:sldLayoutIdLst>
-  <p:hf hdr="0" ftr="0"/>
+  <p:hf sldNum="0" hdr="0" ftr="0" dt="0"/>
   <p:txStyles>
     <p:titleStyle>
       <a:lvl1pPr algn="ctr" rtl="0" fontAlgn="base">
@@ -10812,54 +11342,6 @@
           </a:p>
         </p:txBody>
       </p:sp>
-      <p:sp>
-        <p:nvSpPr>
-          <p:cNvPr id="4" name="Date Placeholder 3"/>
-          <p:cNvSpPr>
-            <a:spLocks noGrp="1"/>
-          </p:cNvSpPr>
-          <p:nvPr>
-            <p:ph type="dt" sz="quarter" idx="2"/>
-          </p:nvPr>
-        </p:nvSpPr>
-        <p:spPr/>
-        <p:txBody>
-          <a:bodyPr/>
-          <a:lstStyle/>
-          <a:p>
-            <a:fld id="{0B328906-6665-6141-9B6E-63143F127B07}" type="datetime3">
-              <a:rPr lang="en-US" smtClean="0"/>
-              <a:pPr/>
-              <a:t>9 August 2015</a:t>
-            </a:fld>
-            <a:endParaRPr lang="en-US"/>
-          </a:p>
-        </p:txBody>
-      </p:sp>
-      <p:sp>
-        <p:nvSpPr>
-          <p:cNvPr id="5" name="Slide Number Placeholder 4"/>
-          <p:cNvSpPr>
-            <a:spLocks noGrp="1"/>
-          </p:cNvSpPr>
-          <p:nvPr>
-            <p:ph type="sldNum" sz="quarter" idx="4"/>
-          </p:nvPr>
-        </p:nvSpPr>
-        <p:spPr/>
-        <p:txBody>
-          <a:bodyPr/>
-          <a:lstStyle/>
-          <a:p>
-            <a:fld id="{0A64406B-A6F3-F141-B145-38FF696564BF}" type="slidenum">
-              <a:rPr lang="en-US" smtClean="0"/>
-              <a:pPr/>
-              <a:t>1</a:t>
-            </a:fld>
-            <a:endParaRPr lang="en-US"/>
-          </a:p>
-        </p:txBody>
-      </p:sp>
     </p:spTree>
     <p:extLst>
       <p:ext uri="{BB962C8B-B14F-4D97-AF65-F5344CB8AC3E}">
@@ -11096,54 +11578,6 @@
           </a:p>
           <a:p>
             <a:endParaRPr lang="en-US" dirty="0"/>
-          </a:p>
-        </p:txBody>
-      </p:sp>
-      <p:sp>
-        <p:nvSpPr>
-          <p:cNvPr id="5" name="Date Placeholder 4"/>
-          <p:cNvSpPr>
-            <a:spLocks noGrp="1"/>
-          </p:cNvSpPr>
-          <p:nvPr>
-            <p:ph type="dt" sz="half" idx="10"/>
-          </p:nvPr>
-        </p:nvSpPr>
-        <p:spPr/>
-        <p:txBody>
-          <a:bodyPr/>
-          <a:lstStyle/>
-          <a:p>
-            <a:fld id="{0B328906-6665-6141-9B6E-63143F127B07}" type="datetime3">
-              <a:rPr lang="en-US" smtClean="0"/>
-              <a:pPr/>
-              <a:t>9 August 2015</a:t>
-            </a:fld>
-            <a:endParaRPr lang="en-US"/>
-          </a:p>
-        </p:txBody>
-      </p:sp>
-      <p:sp>
-        <p:nvSpPr>
-          <p:cNvPr id="6" name="Slide Number Placeholder 5"/>
-          <p:cNvSpPr>
-            <a:spLocks noGrp="1"/>
-          </p:cNvSpPr>
-          <p:nvPr>
-            <p:ph type="sldNum" sz="quarter" idx="12"/>
-          </p:nvPr>
-        </p:nvSpPr>
-        <p:spPr/>
-        <p:txBody>
-          <a:bodyPr/>
-          <a:lstStyle/>
-          <a:p>
-            <a:fld id="{BAA09442-824C-CB44-94B5-D58C6377AB54}" type="slidenum">
-              <a:rPr lang="en-US" smtClean="0"/>
-              <a:pPr/>
-              <a:t>10</a:t>
-            </a:fld>
-            <a:endParaRPr lang="en-US"/>
           </a:p>
         </p:txBody>
       </p:sp>
@@ -11272,7 +11706,6 @@
               <a:rPr lang="en-US" dirty="0" smtClean="0"/>
               <a:t>Does this performance degrade gracefully?</a:t>
             </a:r>
-            <a:endParaRPr lang="en-US" dirty="0" smtClean="0"/>
           </a:p>
           <a:p>
             <a:r>
@@ -11301,54 +11734,6 @@
               <a:rPr lang="en-US" dirty="0" smtClean="0"/>
               <a:t>on assessment and qualitative probabilistic reasoning.</a:t>
             </a:r>
-          </a:p>
-        </p:txBody>
-      </p:sp>
-      <p:sp>
-        <p:nvSpPr>
-          <p:cNvPr id="5" name="Date Placeholder 4"/>
-          <p:cNvSpPr>
-            <a:spLocks noGrp="1"/>
-          </p:cNvSpPr>
-          <p:nvPr>
-            <p:ph type="dt" sz="half" idx="10"/>
-          </p:nvPr>
-        </p:nvSpPr>
-        <p:spPr/>
-        <p:txBody>
-          <a:bodyPr/>
-          <a:lstStyle/>
-          <a:p>
-            <a:fld id="{0B328906-6665-6141-9B6E-63143F127B07}" type="datetime3">
-              <a:rPr lang="en-US" smtClean="0"/>
-              <a:pPr/>
-              <a:t>9 August 2015</a:t>
-            </a:fld>
-            <a:endParaRPr lang="en-US"/>
-          </a:p>
-        </p:txBody>
-      </p:sp>
-      <p:sp>
-        <p:nvSpPr>
-          <p:cNvPr id="6" name="Slide Number Placeholder 5"/>
-          <p:cNvSpPr>
-            <a:spLocks noGrp="1"/>
-          </p:cNvSpPr>
-          <p:nvPr>
-            <p:ph type="sldNum" sz="quarter" idx="12"/>
-          </p:nvPr>
-        </p:nvSpPr>
-        <p:spPr/>
-        <p:txBody>
-          <a:bodyPr/>
-          <a:lstStyle/>
-          <a:p>
-            <a:fld id="{BAA09442-824C-CB44-94B5-D58C6377AB54}" type="slidenum">
-              <a:rPr lang="en-US" smtClean="0"/>
-              <a:pPr/>
-              <a:t>11</a:t>
-            </a:fld>
-            <a:endParaRPr lang="en-US"/>
           </a:p>
         </p:txBody>
       </p:sp>
@@ -11524,54 +11909,6 @@
               <a:t>Vary to answer questions of interest.</a:t>
             </a:r>
             <a:endParaRPr lang="en-US" dirty="0"/>
-          </a:p>
-        </p:txBody>
-      </p:sp>
-      <p:sp>
-        <p:nvSpPr>
-          <p:cNvPr id="4" name="Date Placeholder 3"/>
-          <p:cNvSpPr>
-            <a:spLocks noGrp="1"/>
-          </p:cNvSpPr>
-          <p:nvPr>
-            <p:ph type="dt" sz="half" idx="10"/>
-          </p:nvPr>
-        </p:nvSpPr>
-        <p:spPr/>
-        <p:txBody>
-          <a:bodyPr/>
-          <a:lstStyle/>
-          <a:p>
-            <a:fld id="{0B328906-6665-6141-9B6E-63143F127B07}" type="datetime3">
-              <a:rPr lang="en-US" smtClean="0"/>
-              <a:pPr/>
-              <a:t>9 August 2015</a:t>
-            </a:fld>
-            <a:endParaRPr lang="en-US"/>
-          </a:p>
-        </p:txBody>
-      </p:sp>
-      <p:sp>
-        <p:nvSpPr>
-          <p:cNvPr id="5" name="Slide Number Placeholder 4"/>
-          <p:cNvSpPr>
-            <a:spLocks noGrp="1"/>
-          </p:cNvSpPr>
-          <p:nvPr>
-            <p:ph type="sldNum" sz="quarter" idx="12"/>
-          </p:nvPr>
-        </p:nvSpPr>
-        <p:spPr/>
-        <p:txBody>
-          <a:bodyPr/>
-          <a:lstStyle/>
-          <a:p>
-            <a:fld id="{0A64406B-A6F3-F141-B145-38FF696564BF}" type="slidenum">
-              <a:rPr lang="en-US" smtClean="0"/>
-              <a:pPr/>
-              <a:t>12</a:t>
-            </a:fld>
-            <a:endParaRPr lang="en-US"/>
           </a:p>
         </p:txBody>
       </p:sp>
@@ -13089,54 +13426,6 @@
           </a:p>
         </p:txBody>
       </p:sp>
-      <p:sp>
-        <p:nvSpPr>
-          <p:cNvPr id="4" name="Date Placeholder 3"/>
-          <p:cNvSpPr>
-            <a:spLocks noGrp="1"/>
-          </p:cNvSpPr>
-          <p:nvPr>
-            <p:ph type="dt" sz="half" idx="10"/>
-          </p:nvPr>
-        </p:nvSpPr>
-        <p:spPr/>
-        <p:txBody>
-          <a:bodyPr/>
-          <a:lstStyle/>
-          <a:p>
-            <a:fld id="{0B328906-6665-6141-9B6E-63143F127B07}" type="datetime3">
-              <a:rPr lang="en-US" smtClean="0"/>
-              <a:pPr/>
-              <a:t>9 August 2015</a:t>
-            </a:fld>
-            <a:endParaRPr lang="en-US"/>
-          </a:p>
-        </p:txBody>
-      </p:sp>
-      <p:sp>
-        <p:nvSpPr>
-          <p:cNvPr id="5" name="Slide Number Placeholder 4"/>
-          <p:cNvSpPr>
-            <a:spLocks noGrp="1"/>
-          </p:cNvSpPr>
-          <p:nvPr>
-            <p:ph type="sldNum" sz="quarter" idx="12"/>
-          </p:nvPr>
-        </p:nvSpPr>
-        <p:spPr/>
-        <p:txBody>
-          <a:bodyPr/>
-          <a:lstStyle/>
-          <a:p>
-            <a:fld id="{0A64406B-A6F3-F141-B145-38FF696564BF}" type="slidenum">
-              <a:rPr lang="en-US" smtClean="0"/>
-              <a:pPr/>
-              <a:t>13</a:t>
-            </a:fld>
-            <a:endParaRPr lang="en-US"/>
-          </a:p>
-        </p:txBody>
-      </p:sp>
     </p:spTree>
     <p:extLst>
       <p:ext uri="{BB962C8B-B14F-4D97-AF65-F5344CB8AC3E}">
@@ -13249,54 +13538,6 @@
               <a:t>Also varied the number of sensors/attack.</a:t>
             </a:r>
             <a:endParaRPr lang="en-US" dirty="0"/>
-          </a:p>
-        </p:txBody>
-      </p:sp>
-      <p:sp>
-        <p:nvSpPr>
-          <p:cNvPr id="4" name="Date Placeholder 3"/>
-          <p:cNvSpPr>
-            <a:spLocks noGrp="1"/>
-          </p:cNvSpPr>
-          <p:nvPr>
-            <p:ph type="dt" sz="half" idx="10"/>
-          </p:nvPr>
-        </p:nvSpPr>
-        <p:spPr/>
-        <p:txBody>
-          <a:bodyPr/>
-          <a:lstStyle/>
-          <a:p>
-            <a:fld id="{0B328906-6665-6141-9B6E-63143F127B07}" type="datetime3">
-              <a:rPr lang="en-US" smtClean="0"/>
-              <a:pPr/>
-              <a:t>9 August 2015</a:t>
-            </a:fld>
-            <a:endParaRPr lang="en-US"/>
-          </a:p>
-        </p:txBody>
-      </p:sp>
-      <p:sp>
-        <p:nvSpPr>
-          <p:cNvPr id="5" name="Slide Number Placeholder 4"/>
-          <p:cNvSpPr>
-            <a:spLocks noGrp="1"/>
-          </p:cNvSpPr>
-          <p:nvPr>
-            <p:ph type="sldNum" sz="quarter" idx="12"/>
-          </p:nvPr>
-        </p:nvSpPr>
-        <p:spPr/>
-        <p:txBody>
-          <a:bodyPr/>
-          <a:lstStyle/>
-          <a:p>
-            <a:fld id="{0A64406B-A6F3-F141-B145-38FF696564BF}" type="slidenum">
-              <a:rPr lang="en-US" smtClean="0"/>
-              <a:pPr/>
-              <a:t>14</a:t>
-            </a:fld>
-            <a:endParaRPr lang="en-US"/>
           </a:p>
         </p:txBody>
       </p:sp>
@@ -13394,88 +13635,68 @@
           </a:xfrm>
         </p:spPr>
         <p:txBody>
-          <a:bodyPr/>
+          <a:bodyPr>
+            <a:normAutofit fontScale="77500" lnSpcReduction="20000"/>
+          </a:bodyPr>
           <a:lstStyle/>
           <a:p>
             <a:r>
+              <a:rPr lang="en-US" dirty="0" smtClean="0"/>
+              <a:t>The priors of the various events with </a:t>
+            </a:r>
+            <a:r>
               <a:rPr lang="en-US" dirty="0" err="1" smtClean="0"/>
-              <a:t>Yadda</a:t>
+              <a:t>κ</a:t>
+            </a:r>
+            <a:r>
+              <a:rPr lang="en-US" dirty="0" smtClean="0"/>
+              <a:t>=</a:t>
+            </a:r>
+            <a:r>
+              <a:rPr lang="en-US" i="1" dirty="0" smtClean="0"/>
+              <a:t>n</a:t>
             </a:r>
             <a:r>
               <a:rPr lang="en-US" dirty="0" smtClean="0"/>
               <a:t> </a:t>
             </a:r>
             <a:r>
+              <a:rPr lang="en-US" dirty="0" smtClean="0"/>
+              <a:t>vary, in general. Does this affect the accuracy.</a:t>
+            </a:r>
+          </a:p>
+          <a:p>
+            <a:r>
+              <a:rPr lang="en-US" dirty="0" smtClean="0"/>
+              <a:t>Experimented by using a beta distribution for each of the </a:t>
+            </a:r>
+            <a:r>
               <a:rPr lang="en-US" dirty="0" err="1" smtClean="0"/>
-              <a:t>yadda</a:t>
+              <a:t>κ</a:t>
             </a:r>
             <a:r>
               <a:rPr lang="en-US" dirty="0" smtClean="0"/>
-              <a:t> </a:t>
-            </a:r>
-            <a:r>
-              <a:rPr lang="en-US" dirty="0" err="1" smtClean="0"/>
-              <a:t>yadda</a:t>
-            </a:r>
+              <a:t> values.</a:t>
+            </a:r>
+          </a:p>
+          <a:p>
             <a:r>
               <a:rPr lang="en-US" dirty="0" smtClean="0"/>
-              <a:t>.</a:t>
+              <a:t>Varied the width of the distributions to reflect different central tendencies.</a:t>
+            </a:r>
+          </a:p>
+          <a:p>
+            <a:r>
+              <a:rPr lang="en-US" dirty="0" smtClean="0"/>
+              <a:t>Results show accuracy wasn’t affected. Recall effects seem to be in the noise.</a:t>
             </a:r>
             <a:endParaRPr lang="en-US" dirty="0"/>
-          </a:p>
-        </p:txBody>
-      </p:sp>
-      <p:sp>
-        <p:nvSpPr>
-          <p:cNvPr id="4" name="Date Placeholder 3"/>
-          <p:cNvSpPr>
-            <a:spLocks noGrp="1"/>
-          </p:cNvSpPr>
-          <p:nvPr>
-            <p:ph type="dt" sz="half" idx="10"/>
-          </p:nvPr>
-        </p:nvSpPr>
-        <p:spPr/>
-        <p:txBody>
-          <a:bodyPr/>
-          <a:lstStyle/>
-          <a:p>
-            <a:fld id="{0B328906-6665-6141-9B6E-63143F127B07}" type="datetime3">
-              <a:rPr lang="en-US" smtClean="0"/>
-              <a:pPr/>
-              <a:t>9 August 2015</a:t>
-            </a:fld>
-            <a:endParaRPr lang="en-US"/>
-          </a:p>
-        </p:txBody>
-      </p:sp>
-      <p:sp>
-        <p:nvSpPr>
-          <p:cNvPr id="5" name="Slide Number Placeholder 4"/>
-          <p:cNvSpPr>
-            <a:spLocks noGrp="1"/>
-          </p:cNvSpPr>
-          <p:nvPr>
-            <p:ph type="sldNum" sz="quarter" idx="12"/>
-          </p:nvPr>
-        </p:nvSpPr>
-        <p:spPr/>
-        <p:txBody>
-          <a:bodyPr/>
-          <a:lstStyle/>
-          <a:p>
-            <a:fld id="{0A64406B-A6F3-F141-B145-38FF696564BF}" type="slidenum">
-              <a:rPr lang="en-US" smtClean="0"/>
-              <a:pPr/>
-              <a:t>15</a:t>
-            </a:fld>
-            <a:endParaRPr lang="en-US"/>
           </a:p>
         </p:txBody>
       </p:sp>
       <p:pic>
         <p:nvPicPr>
-          <p:cNvPr id="10" name="Picture 9"/>
+          <p:cNvPr id="6" name="Picture 5"/>
           <p:cNvPicPr>
             <a:picLocks noChangeAspect="1"/>
           </p:cNvPicPr>
@@ -13489,44 +13710,14 @@
         </p:blipFill>
         <p:spPr>
           <a:xfrm>
-            <a:off x="1298522" y="579120"/>
-            <a:ext cx="5828718" cy="3116580"/>
+            <a:off x="1785620" y="975434"/>
+            <a:ext cx="5572760" cy="2484046"/>
           </a:xfrm>
           <a:prstGeom prst="rect">
             <a:avLst/>
           </a:prstGeom>
         </p:spPr>
       </p:pic>
-      <p:sp>
-        <p:nvSpPr>
-          <p:cNvPr id="3" name="TextBox 2"/>
-          <p:cNvSpPr txBox="1"/>
-          <p:nvPr/>
-        </p:nvSpPr>
-        <p:spPr>
-          <a:xfrm>
-            <a:off x="2834640" y="1828800"/>
-            <a:ext cx="2101657" cy="830997"/>
-          </a:xfrm>
-          <a:prstGeom prst="rect">
-            <a:avLst/>
-          </a:prstGeom>
-          <a:noFill/>
-        </p:spPr>
-        <p:txBody>
-          <a:bodyPr wrap="none" rtlCol="0">
-            <a:spAutoFit/>
-          </a:bodyPr>
-          <a:lstStyle/>
-          <a:p>
-            <a:r>
-              <a:rPr lang="en-US" sz="4800" dirty="0" smtClean="0"/>
-              <a:t>GRAPH</a:t>
-            </a:r>
-            <a:endParaRPr lang="en-US" sz="4800" dirty="0"/>
-          </a:p>
-        </p:txBody>
-      </p:sp>
     </p:spTree>
     <p:extLst>
       <p:ext uri="{BB962C8B-B14F-4D97-AF65-F5344CB8AC3E}">
@@ -13597,88 +13788,54 @@
           </a:xfrm>
         </p:spPr>
         <p:txBody>
-          <a:bodyPr/>
+          <a:bodyPr>
+            <a:normAutofit fontScale="77500" lnSpcReduction="20000"/>
+          </a:bodyPr>
           <a:lstStyle/>
           <a:p>
             <a:r>
-              <a:rPr lang="en-US" dirty="0" err="1" smtClean="0"/>
-              <a:t>Yadda</a:t>
-            </a:r>
-            <a:r>
               <a:rPr lang="en-US" dirty="0" smtClean="0"/>
-              <a:t> </a:t>
-            </a:r>
-            <a:r>
-              <a:rPr lang="en-US" dirty="0" err="1" smtClean="0"/>
-              <a:t>yadda</a:t>
-            </a:r>
+              <a:t>How does accuracy fall off when a single report is ambiguous between different events?</a:t>
+            </a:r>
+          </a:p>
+          <a:p>
             <a:r>
               <a:rPr lang="en-US" dirty="0" smtClean="0"/>
-              <a:t> </a:t>
-            </a:r>
-            <a:r>
-              <a:rPr lang="en-US" dirty="0" err="1" smtClean="0"/>
-              <a:t>yadda</a:t>
-            </a:r>
+              <a:t>X labels indicate different distribution over number of events responded to.</a:t>
+            </a:r>
+          </a:p>
+          <a:p>
             <a:r>
               <a:rPr lang="en-US" dirty="0" smtClean="0"/>
-              <a:t>.</a:t>
+              <a:t>Falls off abruptly, starting with 3(0.7)/4(0.3).</a:t>
+            </a:r>
+          </a:p>
+          <a:p>
+            <a:r>
+              <a:rPr lang="en-US" dirty="0" smtClean="0"/>
+              <a:t>Acceptable for our experience of IDS fusion.</a:t>
+            </a:r>
+          </a:p>
+          <a:p>
+            <a:pPr lvl="1"/>
+            <a:r>
+              <a:rPr lang="en-US" dirty="0" smtClean="0"/>
+              <a:t>In practice, most sensors detect only a single event type.</a:t>
+            </a:r>
+          </a:p>
+          <a:p>
+            <a:pPr lvl="1"/>
+            <a:r>
+              <a:rPr lang="en-US" dirty="0" smtClean="0"/>
+              <a:t>High level of ambiguity suggests need for intermediate event.</a:t>
             </a:r>
             <a:endParaRPr lang="en-US" dirty="0"/>
-          </a:p>
-        </p:txBody>
-      </p:sp>
-      <p:sp>
-        <p:nvSpPr>
-          <p:cNvPr id="4" name="Date Placeholder 3"/>
-          <p:cNvSpPr>
-            <a:spLocks noGrp="1"/>
-          </p:cNvSpPr>
-          <p:nvPr>
-            <p:ph type="dt" sz="half" idx="10"/>
-          </p:nvPr>
-        </p:nvSpPr>
-        <p:spPr/>
-        <p:txBody>
-          <a:bodyPr/>
-          <a:lstStyle/>
-          <a:p>
-            <a:fld id="{0B328906-6665-6141-9B6E-63143F127B07}" type="datetime3">
-              <a:rPr lang="en-US" smtClean="0"/>
-              <a:pPr/>
-              <a:t>9 August 2015</a:t>
-            </a:fld>
-            <a:endParaRPr lang="en-US"/>
-          </a:p>
-        </p:txBody>
-      </p:sp>
-      <p:sp>
-        <p:nvSpPr>
-          <p:cNvPr id="5" name="Slide Number Placeholder 4"/>
-          <p:cNvSpPr>
-            <a:spLocks noGrp="1"/>
-          </p:cNvSpPr>
-          <p:nvPr>
-            <p:ph type="sldNum" sz="quarter" idx="12"/>
-          </p:nvPr>
-        </p:nvSpPr>
-        <p:spPr/>
-        <p:txBody>
-          <a:bodyPr/>
-          <a:lstStyle/>
-          <a:p>
-            <a:fld id="{0A64406B-A6F3-F141-B145-38FF696564BF}" type="slidenum">
-              <a:rPr lang="en-US" smtClean="0"/>
-              <a:pPr/>
-              <a:t>16</a:t>
-            </a:fld>
-            <a:endParaRPr lang="en-US"/>
           </a:p>
         </p:txBody>
       </p:sp>
       <p:pic>
         <p:nvPicPr>
-          <p:cNvPr id="10" name="Picture 9"/>
+          <p:cNvPr id="6" name="Picture 5"/>
           <p:cNvPicPr>
             <a:picLocks noChangeAspect="1"/>
           </p:cNvPicPr>
@@ -13692,44 +13849,14 @@
         </p:blipFill>
         <p:spPr>
           <a:xfrm>
-            <a:off x="1298522" y="579120"/>
-            <a:ext cx="5828718" cy="3116580"/>
+            <a:off x="1864360" y="710532"/>
+            <a:ext cx="4953000" cy="2997868"/>
           </a:xfrm>
           <a:prstGeom prst="rect">
             <a:avLst/>
           </a:prstGeom>
         </p:spPr>
       </p:pic>
-      <p:sp>
-        <p:nvSpPr>
-          <p:cNvPr id="3" name="TextBox 2"/>
-          <p:cNvSpPr txBox="1"/>
-          <p:nvPr/>
-        </p:nvSpPr>
-        <p:spPr>
-          <a:xfrm>
-            <a:off x="2834640" y="1828800"/>
-            <a:ext cx="2101657" cy="830997"/>
-          </a:xfrm>
-          <a:prstGeom prst="rect">
-            <a:avLst/>
-          </a:prstGeom>
-          <a:noFill/>
-        </p:spPr>
-        <p:txBody>
-          <a:bodyPr wrap="none" rtlCol="0">
-            <a:spAutoFit/>
-          </a:bodyPr>
-          <a:lstStyle/>
-          <a:p>
-            <a:r>
-              <a:rPr lang="en-US" sz="4800" dirty="0" smtClean="0"/>
-              <a:t>GRAPH</a:t>
-            </a:r>
-            <a:endParaRPr lang="en-US" sz="4800" dirty="0"/>
-          </a:p>
-        </p:txBody>
-      </p:sp>
     </p:spTree>
     <p:extLst>
       <p:ext uri="{BB962C8B-B14F-4D97-AF65-F5344CB8AC3E}">
@@ -13776,8 +13903,12 @@
           <a:lstStyle/>
           <a:p>
             <a:r>
-              <a:rPr lang="en-US" smtClean="0"/>
-              <a:t>Base Rate</a:t>
+              <a:rPr lang="en-US" dirty="0" smtClean="0"/>
+              <a:t>Base </a:t>
+            </a:r>
+            <a:r>
+              <a:rPr lang="en-US" dirty="0" smtClean="0"/>
+              <a:t>Rate - 1</a:t>
             </a:r>
             <a:endParaRPr lang="en-US" dirty="0"/>
           </a:p>
@@ -13804,99 +13935,37 @@
           <a:lstStyle/>
           <a:p>
             <a:r>
-              <a:rPr lang="en-US" dirty="0" err="1" smtClean="0"/>
-              <a:t>Yadda</a:t>
-            </a:r>
-            <a:r>
               <a:rPr lang="en-US" dirty="0" smtClean="0"/>
-              <a:t> </a:t>
-            </a:r>
-            <a:r>
-              <a:rPr lang="en-US" dirty="0" err="1" smtClean="0"/>
-              <a:t>yadda</a:t>
-            </a:r>
+              <a:t>This simple analytical plot shows the core intuition about fusion addressing the base rate problem.</a:t>
+            </a:r>
+          </a:p>
+          <a:p>
             <a:r>
               <a:rPr lang="en-US" dirty="0" smtClean="0"/>
-              <a:t> </a:t>
-            </a:r>
-            <a:r>
-              <a:rPr lang="en-US" dirty="0" err="1" smtClean="0"/>
-              <a:t>yadda</a:t>
-            </a:r>
-            <a:r>
-              <a:rPr lang="en-US" dirty="0" smtClean="0"/>
-              <a:t>.</a:t>
+              <a:t>If sensors fail independently, then fused accuracy rises rapidly with number of sensors. </a:t>
             </a:r>
             <a:endParaRPr lang="en-US" dirty="0"/>
-          </a:p>
-        </p:txBody>
-      </p:sp>
-      <p:sp>
-        <p:nvSpPr>
-          <p:cNvPr id="4" name="Date Placeholder 3"/>
-          <p:cNvSpPr>
-            <a:spLocks noGrp="1"/>
-          </p:cNvSpPr>
-          <p:nvPr>
-            <p:ph type="dt" sz="half" idx="10"/>
-          </p:nvPr>
-        </p:nvSpPr>
-        <p:spPr/>
-        <p:txBody>
-          <a:bodyPr/>
-          <a:lstStyle/>
-          <a:p>
-            <a:fld id="{0B328906-6665-6141-9B6E-63143F127B07}" type="datetime3">
-              <a:rPr lang="en-US" smtClean="0"/>
-              <a:pPr/>
-              <a:t>9 August 2015</a:t>
-            </a:fld>
-            <a:endParaRPr lang="en-US"/>
-          </a:p>
-        </p:txBody>
-      </p:sp>
-      <p:sp>
-        <p:nvSpPr>
-          <p:cNvPr id="5" name="Slide Number Placeholder 4"/>
-          <p:cNvSpPr>
-            <a:spLocks noGrp="1"/>
-          </p:cNvSpPr>
-          <p:nvPr>
-            <p:ph type="sldNum" sz="quarter" idx="12"/>
-          </p:nvPr>
-        </p:nvSpPr>
-        <p:spPr/>
-        <p:txBody>
-          <a:bodyPr/>
-          <a:lstStyle/>
-          <a:p>
-            <a:fld id="{0A64406B-A6F3-F141-B145-38FF696564BF}" type="slidenum">
-              <a:rPr lang="en-US" smtClean="0"/>
-              <a:pPr/>
-              <a:t>17</a:t>
-            </a:fld>
-            <a:endParaRPr lang="en-US"/>
           </a:p>
         </p:txBody>
       </p:sp>
       <p:pic>
         <p:nvPicPr>
-          <p:cNvPr id="10" name="Picture 9"/>
+          <p:cNvPr id="4" name="Picture 3"/>
           <p:cNvPicPr>
             <a:picLocks noChangeAspect="1"/>
           </p:cNvPicPr>
           <p:nvPr/>
         </p:nvPicPr>
         <p:blipFill>
-          <a:blip r:embed="rId2"/>
+          <a:blip r:embed="rId3"/>
           <a:stretch>
             <a:fillRect/>
           </a:stretch>
         </p:blipFill>
         <p:spPr>
           <a:xfrm>
-            <a:off x="1298522" y="579120"/>
-            <a:ext cx="5828718" cy="3116580"/>
+            <a:off x="30617" y="1544320"/>
+            <a:ext cx="8794296" cy="1427480"/>
           </a:xfrm>
           <a:prstGeom prst="rect">
             <a:avLst/>
@@ -13905,14 +13974,14 @@
       </p:pic>
       <p:sp>
         <p:nvSpPr>
-          <p:cNvPr id="3" name="TextBox 2"/>
+          <p:cNvPr id="5" name="TextBox 4"/>
           <p:cNvSpPr txBox="1"/>
           <p:nvPr/>
         </p:nvSpPr>
         <p:spPr>
           <a:xfrm>
-            <a:off x="2834640" y="1828800"/>
-            <a:ext cx="2101657" cy="830997"/>
+            <a:off x="7185686" y="3126740"/>
+            <a:ext cx="1073619" cy="369332"/>
           </a:xfrm>
           <a:prstGeom prst="rect">
             <a:avLst/>
@@ -13925,18 +13994,121 @@
           </a:bodyPr>
           <a:lstStyle/>
           <a:p>
-            <a:r>
-              <a:rPr lang="en-US" sz="4800" dirty="0" smtClean="0"/>
-              <a:t>GRAPH</a:t>
-            </a:r>
-            <a:endParaRPr lang="en-US" sz="4800" dirty="0"/>
+            <a:pPr algn="ctr"/>
+            <a:r>
+              <a:rPr lang="en-US" dirty="0" smtClean="0">
+                <a:solidFill>
+                  <a:srgbClr val="000000"/>
+                </a:solidFill>
+              </a:rPr>
+              <a:t>1 Sensor</a:t>
+            </a:r>
+            <a:endParaRPr lang="en-US" dirty="0">
+              <a:solidFill>
+                <a:srgbClr val="000000"/>
+              </a:solidFill>
+            </a:endParaRPr>
+          </a:p>
+        </p:txBody>
+      </p:sp>
+      <p:sp>
+        <p:nvSpPr>
+          <p:cNvPr id="8" name="TextBox 7"/>
+          <p:cNvSpPr txBox="1"/>
+          <p:nvPr/>
+        </p:nvSpPr>
+        <p:spPr>
+          <a:xfrm>
+            <a:off x="3903297" y="3126740"/>
+            <a:ext cx="1176637" cy="369332"/>
+          </a:xfrm>
+          <a:prstGeom prst="rect">
+            <a:avLst/>
+          </a:prstGeom>
+          <a:noFill/>
+        </p:spPr>
+        <p:txBody>
+          <a:bodyPr wrap="none" rtlCol="0">
+            <a:spAutoFit/>
+          </a:bodyPr>
+          <a:lstStyle/>
+          <a:p>
+            <a:pPr algn="ctr"/>
+            <a:r>
+              <a:rPr lang="en-US" dirty="0">
+                <a:solidFill>
+                  <a:srgbClr val="000000"/>
+                </a:solidFill>
+              </a:rPr>
+              <a:t>2</a:t>
+            </a:r>
+            <a:r>
+              <a:rPr lang="en-US" dirty="0" smtClean="0">
+                <a:solidFill>
+                  <a:srgbClr val="000000"/>
+                </a:solidFill>
+              </a:rPr>
+              <a:t> Sensors</a:t>
+            </a:r>
+            <a:endParaRPr lang="en-US" dirty="0">
+              <a:solidFill>
+                <a:srgbClr val="000000"/>
+              </a:solidFill>
+            </a:endParaRPr>
+          </a:p>
+        </p:txBody>
+      </p:sp>
+      <p:sp>
+        <p:nvSpPr>
+          <p:cNvPr id="9" name="TextBox 8"/>
+          <p:cNvSpPr txBox="1"/>
+          <p:nvPr/>
+        </p:nvSpPr>
+        <p:spPr>
+          <a:xfrm>
+            <a:off x="672417" y="3126740"/>
+            <a:ext cx="1176637" cy="369332"/>
+          </a:xfrm>
+          <a:prstGeom prst="rect">
+            <a:avLst/>
+          </a:prstGeom>
+          <a:noFill/>
+        </p:spPr>
+        <p:txBody>
+          <a:bodyPr wrap="none" rtlCol="0">
+            <a:spAutoFit/>
+          </a:bodyPr>
+          <a:lstStyle/>
+          <a:p>
+            <a:pPr algn="ctr"/>
+            <a:r>
+              <a:rPr lang="en-US" dirty="0">
+                <a:solidFill>
+                  <a:srgbClr val="000000"/>
+                </a:solidFill>
+              </a:rPr>
+              <a:t>3</a:t>
+            </a:r>
+            <a:r>
+              <a:rPr lang="en-US" dirty="0" smtClean="0">
+                <a:solidFill>
+                  <a:srgbClr val="000000"/>
+                </a:solidFill>
+              </a:rPr>
+              <a:t> Sensors</a:t>
+            </a:r>
+            <a:endParaRPr lang="en-US" dirty="0">
+              <a:solidFill>
+                <a:srgbClr val="000000"/>
+              </a:solidFill>
+            </a:endParaRPr>
           </a:p>
         </p:txBody>
       </p:sp>
     </p:spTree>
     <p:extLst>
       <p:ext uri="{BB962C8B-B14F-4D97-AF65-F5344CB8AC3E}">
-        <p14:creationId xmlns:p14="http://schemas.microsoft.com/office/powerpoint/2010/main" val="3368473909"/>
+        <p14:creationId xmlns:p14="http://schemas.microsoft.com/office/powerpoint/2010/main" val="1793391861"/>
       </p:ext>
     </p:extLst>
   </p:cSld>
@@ -13980,7 +14152,11 @@
           <a:p>
             <a:r>
               <a:rPr lang="en-US" dirty="0" smtClean="0"/>
-              <a:t>Conclusions and Future Work</a:t>
+              <a:t>Base </a:t>
+            </a:r>
+            <a:r>
+              <a:rPr lang="en-US" dirty="0" smtClean="0"/>
+              <a:t>Rate - 2</a:t>
             </a:r>
             <a:endParaRPr lang="en-US" dirty="0"/>
           </a:p>
@@ -13988,7 +14164,7 @@
       </p:sp>
       <p:sp>
         <p:nvSpPr>
-          <p:cNvPr id="3" name="Content Placeholder 2"/>
+          <p:cNvPr id="11" name="Content Placeholder 10"/>
           <p:cNvSpPr>
             <a:spLocks noGrp="1"/>
           </p:cNvSpPr>
@@ -13996,102 +14172,73 @@
             <p:ph idx="1"/>
           </p:nvPr>
         </p:nvSpPr>
-        <p:spPr/>
-        <p:txBody>
-          <a:bodyPr/>
+        <p:spPr>
+          <a:xfrm>
+            <a:off x="368300" y="4399280"/>
+            <a:ext cx="8355013" cy="1896745"/>
+          </a:xfrm>
+        </p:spPr>
+        <p:txBody>
+          <a:bodyPr>
+            <a:normAutofit fontScale="77500" lnSpcReduction="20000"/>
+          </a:bodyPr>
           <a:lstStyle/>
           <a:p>
             <a:r>
               <a:rPr lang="en-US" dirty="0" smtClean="0"/>
-              <a:t>System Z+ qualitative reasoning is robust to violations of its modeling assumptions.</a:t>
+              <a:t>As the likelihood of attack events drops, precision falls away.</a:t>
             </a:r>
           </a:p>
           <a:p>
             <a:r>
               <a:rPr lang="en-US" dirty="0" smtClean="0"/>
-              <a:t>These results are applicable to other diagnostic and fusion applications.</a:t>
+              <a:t>Recall remains high.</a:t>
             </a:r>
           </a:p>
           <a:p>
             <a:r>
               <a:rPr lang="en-US" dirty="0" smtClean="0"/>
-              <a:t>We can use these results to guide future applications.</a:t>
-            </a:r>
-          </a:p>
-          <a:p>
+              <a:t>Note: in this framework, MIFD treats all attacks as equally likely.</a:t>
+            </a:r>
+          </a:p>
+          <a:p>
+            <a:pPr lvl="1"/>
             <a:r>
               <a:rPr lang="en-US" dirty="0" smtClean="0"/>
-              <a:t>For cyber defense applications, suggest further study of:</a:t>
-            </a:r>
-          </a:p>
-          <a:p>
-            <a:pPr lvl="1"/>
-            <a:r>
-              <a:rPr lang="en-US" dirty="0" smtClean="0"/>
-              <a:t>Spread of attacks through networks.</a:t>
-            </a:r>
-          </a:p>
-          <a:p>
-            <a:pPr lvl="1"/>
-            <a:r>
-              <a:rPr lang="en-US" dirty="0" smtClean="0"/>
-              <a:t>Event/sub-event structures.</a:t>
-            </a:r>
-          </a:p>
-        </p:txBody>
-      </p:sp>
-      <p:sp>
-        <p:nvSpPr>
-          <p:cNvPr id="4" name="Date Placeholder 3"/>
-          <p:cNvSpPr>
-            <a:spLocks noGrp="1"/>
-          </p:cNvSpPr>
-          <p:nvPr>
-            <p:ph type="dt" sz="half" idx="10"/>
-          </p:nvPr>
-        </p:nvSpPr>
-        <p:spPr/>
-        <p:txBody>
-          <a:bodyPr/>
-          <a:lstStyle/>
-          <a:p>
-            <a:fld id="{0B328906-6665-6141-9B6E-63143F127B07}" type="datetime3">
-              <a:rPr lang="en-US" smtClean="0"/>
-              <a:pPr/>
-              <a:t>9 August 2015</a:t>
-            </a:fld>
-            <a:endParaRPr lang="en-US"/>
-          </a:p>
-        </p:txBody>
-      </p:sp>
-      <p:sp>
-        <p:nvSpPr>
-          <p:cNvPr id="5" name="Slide Number Placeholder 4"/>
-          <p:cNvSpPr>
-            <a:spLocks noGrp="1"/>
-          </p:cNvSpPr>
-          <p:nvPr>
-            <p:ph type="sldNum" sz="quarter" idx="12"/>
-          </p:nvPr>
-        </p:nvSpPr>
-        <p:spPr/>
-        <p:txBody>
-          <a:bodyPr/>
-          <a:lstStyle/>
-          <a:p>
-            <a:fld id="{0A64406B-A6F3-F141-B145-38FF696564BF}" type="slidenum">
-              <a:rPr lang="en-US" smtClean="0"/>
-              <a:pPr/>
-              <a:t>18</a:t>
-            </a:fld>
-            <a:endParaRPr lang="en-US"/>
-          </a:p>
-        </p:txBody>
-      </p:sp>
+              <a:t>If facing specifically rare events, we can adjust the amount of sensing required to accept such hypotheses.</a:t>
+            </a:r>
+            <a:endParaRPr lang="en-US" dirty="0"/>
+          </a:p>
+        </p:txBody>
+      </p:sp>
+      <p:pic>
+        <p:nvPicPr>
+          <p:cNvPr id="6" name="Picture 5"/>
+          <p:cNvPicPr>
+            <a:picLocks noChangeAspect="1"/>
+          </p:cNvPicPr>
+          <p:nvPr/>
+        </p:nvPicPr>
+        <p:blipFill>
+          <a:blip r:embed="rId2"/>
+          <a:stretch>
+            <a:fillRect/>
+          </a:stretch>
+        </p:blipFill>
+        <p:spPr>
+          <a:xfrm>
+            <a:off x="1224313" y="914400"/>
+            <a:ext cx="6532847" cy="2931160"/>
+          </a:xfrm>
+          <a:prstGeom prst="rect">
+            <a:avLst/>
+          </a:prstGeom>
+        </p:spPr>
+      </p:pic>
     </p:spTree>
     <p:extLst>
       <p:ext uri="{BB962C8B-B14F-4D97-AF65-F5344CB8AC3E}">
-        <p14:creationId xmlns:p14="http://schemas.microsoft.com/office/powerpoint/2010/main" val="642060318"/>
+        <p14:creationId xmlns:p14="http://schemas.microsoft.com/office/powerpoint/2010/main" val="3368473909"/>
       </p:ext>
     </p:extLst>
   </p:cSld>
@@ -14133,38 +14280,76 @@
           <a:bodyPr/>
           <a:lstStyle/>
           <a:p>
+            <a:r>
+              <a:rPr lang="en-US" dirty="0" smtClean="0"/>
+              <a:t>Conclusions and Future Work</a:t>
+            </a:r>
             <a:endParaRPr lang="en-US" dirty="0"/>
           </a:p>
         </p:txBody>
       </p:sp>
-      <p:pic>
-        <p:nvPicPr>
-          <p:cNvPr id="3" name="Picture 2"/>
-          <p:cNvPicPr>
-            <a:picLocks noChangeAspect="1"/>
-          </p:cNvPicPr>
-          <p:nvPr/>
-        </p:nvPicPr>
-        <p:blipFill>
-          <a:blip r:embed="rId2"/>
-          <a:stretch>
-            <a:fillRect/>
-          </a:stretch>
-        </p:blipFill>
-        <p:spPr>
-          <a:xfrm>
-            <a:off x="254000" y="1501010"/>
-            <a:ext cx="8636000" cy="4864100"/>
-          </a:xfrm>
-          <a:prstGeom prst="rect">
-            <a:avLst/>
-          </a:prstGeom>
-        </p:spPr>
-      </p:pic>
+      <p:sp>
+        <p:nvSpPr>
+          <p:cNvPr id="3" name="Content Placeholder 2"/>
+          <p:cNvSpPr>
+            <a:spLocks noGrp="1"/>
+          </p:cNvSpPr>
+          <p:nvPr>
+            <p:ph idx="1"/>
+          </p:nvPr>
+        </p:nvSpPr>
+        <p:spPr/>
+        <p:txBody>
+          <a:bodyPr/>
+          <a:lstStyle/>
+          <a:p>
+            <a:r>
+              <a:rPr lang="en-US" dirty="0" smtClean="0"/>
+              <a:t>Results illuminate why Scyllarus and MIFD have been successful in practice: System </a:t>
+            </a:r>
+            <a:r>
+              <a:rPr lang="en-US" dirty="0" smtClean="0"/>
+              <a:t>Z+ qualitative reasoning is robust to violations of its modeling assumptions.</a:t>
+            </a:r>
+          </a:p>
+          <a:p>
+            <a:r>
+              <a:rPr lang="en-US" dirty="0" smtClean="0"/>
+              <a:t>These results are applicable to other diagnostic and fusion applications.</a:t>
+            </a:r>
+          </a:p>
+          <a:p>
+            <a:r>
+              <a:rPr lang="en-US" dirty="0" smtClean="0"/>
+              <a:t>We can use these results to guide future applications.</a:t>
+            </a:r>
+          </a:p>
+          <a:p>
+            <a:r>
+              <a:rPr lang="en-US" dirty="0" smtClean="0"/>
+              <a:t>For cyber defense applications, suggest further study of:</a:t>
+            </a:r>
+          </a:p>
+          <a:p>
+            <a:pPr lvl="1"/>
+            <a:r>
+              <a:rPr lang="en-US" dirty="0" smtClean="0"/>
+              <a:t>Spread of attacks through networks.</a:t>
+            </a:r>
+          </a:p>
+          <a:p>
+            <a:pPr lvl="1"/>
+            <a:r>
+              <a:rPr lang="en-US" dirty="0" smtClean="0"/>
+              <a:t>Event/sub-event structures.</a:t>
+            </a:r>
+          </a:p>
+        </p:txBody>
+      </p:sp>
     </p:spTree>
     <p:extLst>
       <p:ext uri="{BB962C8B-B14F-4D97-AF65-F5344CB8AC3E}">
-        <p14:creationId xmlns:p14="http://schemas.microsoft.com/office/powerpoint/2010/main" val="3852138009"/>
+        <p14:creationId xmlns:p14="http://schemas.microsoft.com/office/powerpoint/2010/main" val="642060318"/>
       </p:ext>
     </p:extLst>
   </p:cSld>
@@ -14292,54 +14477,6 @@
               <a:rPr lang="en-US" dirty="0" smtClean="0"/>
               <a:t>Conclusions</a:t>
             </a:r>
-          </a:p>
-        </p:txBody>
-      </p:sp>
-      <p:sp>
-        <p:nvSpPr>
-          <p:cNvPr id="4" name="Date Placeholder 3"/>
-          <p:cNvSpPr>
-            <a:spLocks noGrp="1"/>
-          </p:cNvSpPr>
-          <p:nvPr>
-            <p:ph type="dt" sz="half" idx="10"/>
-          </p:nvPr>
-        </p:nvSpPr>
-        <p:spPr/>
-        <p:txBody>
-          <a:bodyPr/>
-          <a:lstStyle/>
-          <a:p>
-            <a:fld id="{0B328906-6665-6141-9B6E-63143F127B07}" type="datetime3">
-              <a:rPr lang="en-US" smtClean="0"/>
-              <a:pPr/>
-              <a:t>9 August 2015</a:t>
-            </a:fld>
-            <a:endParaRPr lang="en-US"/>
-          </a:p>
-        </p:txBody>
-      </p:sp>
-      <p:sp>
-        <p:nvSpPr>
-          <p:cNvPr id="5" name="Slide Number Placeholder 4"/>
-          <p:cNvSpPr>
-            <a:spLocks noGrp="1"/>
-          </p:cNvSpPr>
-          <p:nvPr>
-            <p:ph type="sldNum" sz="quarter" idx="12"/>
-          </p:nvPr>
-        </p:nvSpPr>
-        <p:spPr/>
-        <p:txBody>
-          <a:bodyPr/>
-          <a:lstStyle/>
-          <a:p>
-            <a:fld id="{0A64406B-A6F3-F141-B145-38FF696564BF}" type="slidenum">
-              <a:rPr lang="en-US" smtClean="0"/>
-              <a:pPr/>
-              <a:t>2</a:t>
-            </a:fld>
-            <a:endParaRPr lang="en-US"/>
           </a:p>
         </p:txBody>
       </p:sp>
@@ -14484,54 +14621,6 @@
           </a:p>
         </p:txBody>
       </p:sp>
-      <p:sp>
-        <p:nvSpPr>
-          <p:cNvPr id="4" name="Date Placeholder 3"/>
-          <p:cNvSpPr>
-            <a:spLocks noGrp="1"/>
-          </p:cNvSpPr>
-          <p:nvPr>
-            <p:ph type="dt" sz="half" idx="10"/>
-          </p:nvPr>
-        </p:nvSpPr>
-        <p:spPr/>
-        <p:txBody>
-          <a:bodyPr/>
-          <a:lstStyle/>
-          <a:p>
-            <a:fld id="{0B328906-6665-6141-9B6E-63143F127B07}" type="datetime3">
-              <a:rPr lang="en-US" smtClean="0"/>
-              <a:pPr/>
-              <a:t>9 August 2015</a:t>
-            </a:fld>
-            <a:endParaRPr lang="en-US"/>
-          </a:p>
-        </p:txBody>
-      </p:sp>
-      <p:sp>
-        <p:nvSpPr>
-          <p:cNvPr id="5" name="Slide Number Placeholder 4"/>
-          <p:cNvSpPr>
-            <a:spLocks noGrp="1"/>
-          </p:cNvSpPr>
-          <p:nvPr>
-            <p:ph type="sldNum" sz="quarter" idx="12"/>
-          </p:nvPr>
-        </p:nvSpPr>
-        <p:spPr/>
-        <p:txBody>
-          <a:bodyPr/>
-          <a:lstStyle/>
-          <a:p>
-            <a:fld id="{0A64406B-A6F3-F141-B145-38FF696564BF}" type="slidenum">
-              <a:rPr lang="en-US" smtClean="0"/>
-              <a:pPr/>
-              <a:t>3</a:t>
-            </a:fld>
-            <a:endParaRPr lang="en-US"/>
-          </a:p>
-        </p:txBody>
-      </p:sp>
     </p:spTree>
     <p:extLst>
       <p:ext uri="{BB962C8B-B14F-4D97-AF65-F5344CB8AC3E}">
@@ -14660,54 +14749,6 @@
           </a:p>
         </p:txBody>
       </p:sp>
-      <p:sp>
-        <p:nvSpPr>
-          <p:cNvPr id="4" name="Date Placeholder 3"/>
-          <p:cNvSpPr>
-            <a:spLocks noGrp="1"/>
-          </p:cNvSpPr>
-          <p:nvPr>
-            <p:ph type="dt" sz="half" idx="10"/>
-          </p:nvPr>
-        </p:nvSpPr>
-        <p:spPr/>
-        <p:txBody>
-          <a:bodyPr/>
-          <a:lstStyle/>
-          <a:p>
-            <a:fld id="{0B328906-6665-6141-9B6E-63143F127B07}" type="datetime3">
-              <a:rPr lang="en-US" smtClean="0"/>
-              <a:pPr/>
-              <a:t>9 August 2015</a:t>
-            </a:fld>
-            <a:endParaRPr lang="en-US"/>
-          </a:p>
-        </p:txBody>
-      </p:sp>
-      <p:sp>
-        <p:nvSpPr>
-          <p:cNvPr id="5" name="Slide Number Placeholder 4"/>
-          <p:cNvSpPr>
-            <a:spLocks noGrp="1"/>
-          </p:cNvSpPr>
-          <p:nvPr>
-            <p:ph type="sldNum" sz="quarter" idx="12"/>
-          </p:nvPr>
-        </p:nvSpPr>
-        <p:spPr/>
-        <p:txBody>
-          <a:bodyPr/>
-          <a:lstStyle/>
-          <a:p>
-            <a:fld id="{0A64406B-A6F3-F141-B145-38FF696564BF}" type="slidenum">
-              <a:rPr lang="en-US" smtClean="0"/>
-              <a:pPr/>
-              <a:t>4</a:t>
-            </a:fld>
-            <a:endParaRPr lang="en-US"/>
-          </a:p>
-        </p:txBody>
-      </p:sp>
     </p:spTree>
     <p:extLst>
       <p:ext uri="{BB962C8B-B14F-4D97-AF65-F5344CB8AC3E}">
@@ -14978,54 +15019,6 @@
           </a:p>
         </p:txBody>
       </p:sp>
-      <p:sp>
-        <p:nvSpPr>
-          <p:cNvPr id="4" name="Date Placeholder 3"/>
-          <p:cNvSpPr>
-            <a:spLocks noGrp="1"/>
-          </p:cNvSpPr>
-          <p:nvPr>
-            <p:ph type="dt" sz="half" idx="10"/>
-          </p:nvPr>
-        </p:nvSpPr>
-        <p:spPr/>
-        <p:txBody>
-          <a:bodyPr/>
-          <a:lstStyle/>
-          <a:p>
-            <a:fld id="{0B328906-6665-6141-9B6E-63143F127B07}" type="datetime3">
-              <a:rPr lang="en-US" smtClean="0"/>
-              <a:pPr/>
-              <a:t>9 August 2015</a:t>
-            </a:fld>
-            <a:endParaRPr lang="en-US"/>
-          </a:p>
-        </p:txBody>
-      </p:sp>
-      <p:sp>
-        <p:nvSpPr>
-          <p:cNvPr id="5" name="Slide Number Placeholder 4"/>
-          <p:cNvSpPr>
-            <a:spLocks noGrp="1"/>
-          </p:cNvSpPr>
-          <p:nvPr>
-            <p:ph type="sldNum" sz="quarter" idx="12"/>
-          </p:nvPr>
-        </p:nvSpPr>
-        <p:spPr/>
-        <p:txBody>
-          <a:bodyPr/>
-          <a:lstStyle/>
-          <a:p>
-            <a:fld id="{0A64406B-A6F3-F141-B145-38FF696564BF}" type="slidenum">
-              <a:rPr lang="en-US" smtClean="0"/>
-              <a:pPr/>
-              <a:t>5</a:t>
-            </a:fld>
-            <a:endParaRPr lang="en-US"/>
-          </a:p>
-        </p:txBody>
-      </p:sp>
     </p:spTree>
     <p:extLst>
       <p:ext uri="{BB962C8B-B14F-4D97-AF65-F5344CB8AC3E}">
@@ -15116,54 +15109,6 @@
               <a:rPr lang="en-US" dirty="0" smtClean="0"/>
               <a:t>to reduce the total number of alerts.</a:t>
             </a:r>
-          </a:p>
-        </p:txBody>
-      </p:sp>
-      <p:sp>
-        <p:nvSpPr>
-          <p:cNvPr id="4" name="Date Placeholder 3"/>
-          <p:cNvSpPr>
-            <a:spLocks noGrp="1"/>
-          </p:cNvSpPr>
-          <p:nvPr>
-            <p:ph type="dt" sz="half" idx="10"/>
-          </p:nvPr>
-        </p:nvSpPr>
-        <p:spPr/>
-        <p:txBody>
-          <a:bodyPr/>
-          <a:lstStyle/>
-          <a:p>
-            <a:fld id="{0B328906-6665-6141-9B6E-63143F127B07}" type="datetime3">
-              <a:rPr lang="en-US" smtClean="0"/>
-              <a:pPr/>
-              <a:t>9 August 2015</a:t>
-            </a:fld>
-            <a:endParaRPr lang="en-US"/>
-          </a:p>
-        </p:txBody>
-      </p:sp>
-      <p:sp>
-        <p:nvSpPr>
-          <p:cNvPr id="5" name="Slide Number Placeholder 4"/>
-          <p:cNvSpPr>
-            <a:spLocks noGrp="1"/>
-          </p:cNvSpPr>
-          <p:nvPr>
-            <p:ph type="sldNum" sz="quarter" idx="12"/>
-          </p:nvPr>
-        </p:nvSpPr>
-        <p:spPr/>
-        <p:txBody>
-          <a:bodyPr/>
-          <a:lstStyle/>
-          <a:p>
-            <a:fld id="{0A64406B-A6F3-F141-B145-38FF696564BF}" type="slidenum">
-              <a:rPr lang="en-US" smtClean="0"/>
-              <a:pPr/>
-              <a:t>6</a:t>
-            </a:fld>
-            <a:endParaRPr lang="en-US"/>
           </a:p>
         </p:txBody>
       </p:sp>
@@ -15360,30 +15305,6 @@
           </a:p>
           <a:p>
             <a:endParaRPr lang="en-US" dirty="0"/>
-          </a:p>
-        </p:txBody>
-      </p:sp>
-      <p:sp>
-        <p:nvSpPr>
-          <p:cNvPr id="5" name="Slide Number Placeholder 4"/>
-          <p:cNvSpPr>
-            <a:spLocks noGrp="1"/>
-          </p:cNvSpPr>
-          <p:nvPr>
-            <p:ph type="sldNum" sz="quarter" idx="12"/>
-          </p:nvPr>
-        </p:nvSpPr>
-        <p:spPr/>
-        <p:txBody>
-          <a:bodyPr/>
-          <a:lstStyle/>
-          <a:p>
-            <a:fld id="{0A64406B-A6F3-F141-B145-38FF696564BF}" type="slidenum">
-              <a:rPr lang="en-US" smtClean="0"/>
-              <a:pPr/>
-              <a:t>7</a:t>
-            </a:fld>
-            <a:endParaRPr lang="en-US"/>
           </a:p>
         </p:txBody>
       </p:sp>
@@ -16225,59 +16146,6 @@
           </a:p>
           <a:p>
             <a:endParaRPr lang="en-US" dirty="0"/>
-          </a:p>
-        </p:txBody>
-      </p:sp>
-      <p:sp>
-        <p:nvSpPr>
-          <p:cNvPr id="4" name="Date Placeholder 3"/>
-          <p:cNvSpPr>
-            <a:spLocks noGrp="1"/>
-          </p:cNvSpPr>
-          <p:nvPr>
-            <p:ph type="dt" sz="half" idx="10"/>
-          </p:nvPr>
-        </p:nvSpPr>
-        <p:spPr>
-          <a:xfrm>
-            <a:off x="6178550" y="6109018"/>
-            <a:ext cx="1855788" cy="284162"/>
-          </a:xfrm>
-        </p:spPr>
-        <p:txBody>
-          <a:bodyPr/>
-          <a:lstStyle/>
-          <a:p>
-            <a:fld id="{0B328906-6665-6141-9B6E-63143F127B07}" type="datetime3">
-              <a:rPr lang="en-US" smtClean="0"/>
-              <a:pPr/>
-              <a:t>9 August 2015</a:t>
-            </a:fld>
-            <a:endParaRPr lang="en-US"/>
-          </a:p>
-        </p:txBody>
-      </p:sp>
-      <p:sp>
-        <p:nvSpPr>
-          <p:cNvPr id="5" name="Slide Number Placeholder 4"/>
-          <p:cNvSpPr>
-            <a:spLocks noGrp="1"/>
-          </p:cNvSpPr>
-          <p:nvPr>
-            <p:ph type="sldNum" sz="quarter" idx="12"/>
-          </p:nvPr>
-        </p:nvSpPr>
-        <p:spPr/>
-        <p:txBody>
-          <a:bodyPr/>
-          <a:lstStyle/>
-          <a:p>
-            <a:fld id="{0A64406B-A6F3-F141-B145-38FF696564BF}" type="slidenum">
-              <a:rPr lang="en-US" smtClean="0"/>
-              <a:pPr/>
-              <a:t>8</a:t>
-            </a:fld>
-            <a:endParaRPr lang="en-US"/>
           </a:p>
         </p:txBody>
       </p:sp>
@@ -17577,30 +17445,6 @@
           </a:p>
           <a:p>
             <a:endParaRPr lang="en-US" dirty="0"/>
-          </a:p>
-        </p:txBody>
-      </p:sp>
-      <p:sp>
-        <p:nvSpPr>
-          <p:cNvPr id="5" name="Slide Number Placeholder 4"/>
-          <p:cNvSpPr>
-            <a:spLocks noGrp="1"/>
-          </p:cNvSpPr>
-          <p:nvPr>
-            <p:ph type="sldNum" sz="quarter" idx="12"/>
-          </p:nvPr>
-        </p:nvSpPr>
-        <p:spPr/>
-        <p:txBody>
-          <a:bodyPr/>
-          <a:lstStyle/>
-          <a:p>
-            <a:fld id="{0A64406B-A6F3-F141-B145-38FF696564BF}" type="slidenum">
-              <a:rPr lang="en-US" smtClean="0"/>
-              <a:pPr/>
-              <a:t>9</a:t>
-            </a:fld>
-            <a:endParaRPr lang="en-US"/>
           </a:p>
         </p:txBody>
       </p:sp>
@@ -19055,4 +18899,644 @@
     </a:extraClrScheme>
   </a:extraClrSchemeLst>
 </a:theme>
+</file>
+
+<file path=ppt/theme/theme3.xml><?xml version="1.0" encoding="utf-8"?>
+<a:theme xmlns:a="http://schemas.openxmlformats.org/drawingml/2006/main" name="Office Theme">
+  <a:themeElements>
+    <a:clrScheme name="Office">
+      <a:dk1>
+        <a:sysClr val="windowText" lastClr="000000"/>
+      </a:dk1>
+      <a:lt1>
+        <a:sysClr val="window" lastClr="FFFFFF"/>
+      </a:lt1>
+      <a:dk2>
+        <a:srgbClr val="1F497D"/>
+      </a:dk2>
+      <a:lt2>
+        <a:srgbClr val="EEECE1"/>
+      </a:lt2>
+      <a:accent1>
+        <a:srgbClr val="4F81BD"/>
+      </a:accent1>
+      <a:accent2>
+        <a:srgbClr val="C0504D"/>
+      </a:accent2>
+      <a:accent3>
+        <a:srgbClr val="9BBB59"/>
+      </a:accent3>
+      <a:accent4>
+        <a:srgbClr val="8064A2"/>
+      </a:accent4>
+      <a:accent5>
+        <a:srgbClr val="4BACC6"/>
+      </a:accent5>
+      <a:accent6>
+        <a:srgbClr val="F79646"/>
+      </a:accent6>
+      <a:hlink>
+        <a:srgbClr val="0000FF"/>
+      </a:hlink>
+      <a:folHlink>
+        <a:srgbClr val="800080"/>
+      </a:folHlink>
+    </a:clrScheme>
+    <a:fontScheme name="Office">
+      <a:majorFont>
+        <a:latin typeface="Calibri"/>
+        <a:ea typeface=""/>
+        <a:cs typeface=""/>
+        <a:font script="Jpan" typeface="ＭＳ Ｐゴシック"/>
+        <a:font script="Hang" typeface="맑은 고딕"/>
+        <a:font script="Hans" typeface="宋体"/>
+        <a:font script="Hant" typeface="新細明體"/>
+        <a:font script="Arab" typeface="Times New Roman"/>
+        <a:font script="Hebr" typeface="Times New Roman"/>
+        <a:font script="Thai" typeface="Angsana New"/>
+        <a:font script="Ethi" typeface="Nyala"/>
+        <a:font script="Beng" typeface="Vrinda"/>
+        <a:font script="Gujr" typeface="Shruti"/>
+        <a:font script="Khmr" typeface="MoolBoran"/>
+        <a:font script="Knda" typeface="Tunga"/>
+        <a:font script="Guru" typeface="Raavi"/>
+        <a:font script="Cans" typeface="Euphemia"/>
+        <a:font script="Cher" typeface="Plantagenet Cherokee"/>
+        <a:font script="Yiii" typeface="Microsoft Yi Baiti"/>
+        <a:font script="Tibt" typeface="Microsoft Himalaya"/>
+        <a:font script="Thaa" typeface="MV Boli"/>
+        <a:font script="Deva" typeface="Mangal"/>
+        <a:font script="Telu" typeface="Gautami"/>
+        <a:font script="Taml" typeface="Latha"/>
+        <a:font script="Syrc" typeface="Estrangelo Edessa"/>
+        <a:font script="Orya" typeface="Kalinga"/>
+        <a:font script="Mlym" typeface="Kartika"/>
+        <a:font script="Laoo" typeface="DokChampa"/>
+        <a:font script="Sinh" typeface="Iskoola Pota"/>
+        <a:font script="Mong" typeface="Mongolian Baiti"/>
+        <a:font script="Viet" typeface="Times New Roman"/>
+        <a:font script="Uigh" typeface="Microsoft Uighur"/>
+        <a:font script="Geor" typeface="Sylfaen"/>
+      </a:majorFont>
+      <a:minorFont>
+        <a:latin typeface="Calibri"/>
+        <a:ea typeface=""/>
+        <a:cs typeface=""/>
+        <a:font script="Jpan" typeface="ＭＳ Ｐゴシック"/>
+        <a:font script="Hang" typeface="맑은 고딕"/>
+        <a:font script="Hans" typeface="宋体"/>
+        <a:font script="Hant" typeface="新細明體"/>
+        <a:font script="Arab" typeface="Arial"/>
+        <a:font script="Hebr" typeface="Arial"/>
+        <a:font script="Thai" typeface="Cordia New"/>
+        <a:font script="Ethi" typeface="Nyala"/>
+        <a:font script="Beng" typeface="Vrinda"/>
+        <a:font script="Gujr" typeface="Shruti"/>
+        <a:font script="Khmr" typeface="DaunPenh"/>
+        <a:font script="Knda" typeface="Tunga"/>
+        <a:font script="Guru" typeface="Raavi"/>
+        <a:font script="Cans" typeface="Euphemia"/>
+        <a:font script="Cher" typeface="Plantagenet Cherokee"/>
+        <a:font script="Yiii" typeface="Microsoft Yi Baiti"/>
+        <a:font script="Tibt" typeface="Microsoft Himalaya"/>
+        <a:font script="Thaa" typeface="MV Boli"/>
+        <a:font script="Deva" typeface="Mangal"/>
+        <a:font script="Telu" typeface="Gautami"/>
+        <a:font script="Taml" typeface="Latha"/>
+        <a:font script="Syrc" typeface="Estrangelo Edessa"/>
+        <a:font script="Orya" typeface="Kalinga"/>
+        <a:font script="Mlym" typeface="Kartika"/>
+        <a:font script="Laoo" typeface="DokChampa"/>
+        <a:font script="Sinh" typeface="Iskoola Pota"/>
+        <a:font script="Mong" typeface="Mongolian Baiti"/>
+        <a:font script="Viet" typeface="Arial"/>
+        <a:font script="Uigh" typeface="Microsoft Uighur"/>
+        <a:font script="Geor" typeface="Sylfaen"/>
+      </a:minorFont>
+    </a:fontScheme>
+    <a:fmtScheme name="Office">
+      <a:fillStyleLst>
+        <a:solidFill>
+          <a:schemeClr val="phClr"/>
+        </a:solidFill>
+        <a:gradFill rotWithShape="1">
+          <a:gsLst>
+            <a:gs pos="0">
+              <a:schemeClr val="phClr">
+                <a:tint val="50000"/>
+                <a:satMod val="300000"/>
+              </a:schemeClr>
+            </a:gs>
+            <a:gs pos="35000">
+              <a:schemeClr val="phClr">
+                <a:tint val="37000"/>
+                <a:satMod val="300000"/>
+              </a:schemeClr>
+            </a:gs>
+            <a:gs pos="100000">
+              <a:schemeClr val="phClr">
+                <a:tint val="15000"/>
+                <a:satMod val="350000"/>
+              </a:schemeClr>
+            </a:gs>
+          </a:gsLst>
+          <a:lin ang="16200000" scaled="1"/>
+        </a:gradFill>
+        <a:gradFill rotWithShape="1">
+          <a:gsLst>
+            <a:gs pos="0">
+              <a:schemeClr val="phClr">
+                <a:tint val="100000"/>
+                <a:shade val="100000"/>
+                <a:satMod val="130000"/>
+              </a:schemeClr>
+            </a:gs>
+            <a:gs pos="100000">
+              <a:schemeClr val="phClr">
+                <a:tint val="50000"/>
+                <a:shade val="100000"/>
+                <a:satMod val="350000"/>
+              </a:schemeClr>
+            </a:gs>
+          </a:gsLst>
+          <a:lin ang="16200000" scaled="0"/>
+        </a:gradFill>
+      </a:fillStyleLst>
+      <a:lnStyleLst>
+        <a:ln w="9525" cap="flat" cmpd="sng" algn="ctr">
+          <a:solidFill>
+            <a:schemeClr val="phClr">
+              <a:shade val="95000"/>
+              <a:satMod val="105000"/>
+            </a:schemeClr>
+          </a:solidFill>
+          <a:prstDash val="solid"/>
+        </a:ln>
+        <a:ln w="25400" cap="flat" cmpd="sng" algn="ctr">
+          <a:solidFill>
+            <a:schemeClr val="phClr"/>
+          </a:solidFill>
+          <a:prstDash val="solid"/>
+        </a:ln>
+        <a:ln w="38100" cap="flat" cmpd="sng" algn="ctr">
+          <a:solidFill>
+            <a:schemeClr val="phClr"/>
+          </a:solidFill>
+          <a:prstDash val="solid"/>
+        </a:ln>
+      </a:lnStyleLst>
+      <a:effectStyleLst>
+        <a:effectStyle>
+          <a:effectLst>
+            <a:outerShdw blurRad="40000" dist="20000" dir="5400000" rotWithShape="0">
+              <a:srgbClr val="000000">
+                <a:alpha val="38000"/>
+              </a:srgbClr>
+            </a:outerShdw>
+          </a:effectLst>
+        </a:effectStyle>
+        <a:effectStyle>
+          <a:effectLst>
+            <a:outerShdw blurRad="40000" dist="23000" dir="5400000" rotWithShape="0">
+              <a:srgbClr val="000000">
+                <a:alpha val="35000"/>
+              </a:srgbClr>
+            </a:outerShdw>
+          </a:effectLst>
+        </a:effectStyle>
+        <a:effectStyle>
+          <a:effectLst>
+            <a:outerShdw blurRad="40000" dist="23000" dir="5400000" rotWithShape="0">
+              <a:srgbClr val="000000">
+                <a:alpha val="35000"/>
+              </a:srgbClr>
+            </a:outerShdw>
+          </a:effectLst>
+          <a:scene3d>
+            <a:camera prst="orthographicFront">
+              <a:rot lat="0" lon="0" rev="0"/>
+            </a:camera>
+            <a:lightRig rig="threePt" dir="t">
+              <a:rot lat="0" lon="0" rev="1200000"/>
+            </a:lightRig>
+          </a:scene3d>
+          <a:sp3d>
+            <a:bevelT w="63500" h="25400"/>
+          </a:sp3d>
+        </a:effectStyle>
+      </a:effectStyleLst>
+      <a:bgFillStyleLst>
+        <a:solidFill>
+          <a:schemeClr val="phClr"/>
+        </a:solidFill>
+        <a:gradFill rotWithShape="1">
+          <a:gsLst>
+            <a:gs pos="0">
+              <a:schemeClr val="phClr">
+                <a:tint val="40000"/>
+                <a:satMod val="350000"/>
+              </a:schemeClr>
+            </a:gs>
+            <a:gs pos="40000">
+              <a:schemeClr val="phClr">
+                <a:tint val="45000"/>
+                <a:shade val="99000"/>
+                <a:satMod val="350000"/>
+              </a:schemeClr>
+            </a:gs>
+            <a:gs pos="100000">
+              <a:schemeClr val="phClr">
+                <a:shade val="20000"/>
+                <a:satMod val="255000"/>
+              </a:schemeClr>
+            </a:gs>
+          </a:gsLst>
+          <a:path path="circle">
+            <a:fillToRect l="50000" t="-80000" r="50000" b="180000"/>
+          </a:path>
+        </a:gradFill>
+        <a:gradFill rotWithShape="1">
+          <a:gsLst>
+            <a:gs pos="0">
+              <a:schemeClr val="phClr">
+                <a:tint val="80000"/>
+                <a:satMod val="300000"/>
+              </a:schemeClr>
+            </a:gs>
+            <a:gs pos="100000">
+              <a:schemeClr val="phClr">
+                <a:shade val="30000"/>
+                <a:satMod val="200000"/>
+              </a:schemeClr>
+            </a:gs>
+          </a:gsLst>
+          <a:path path="circle">
+            <a:fillToRect l="50000" t="50000" r="50000" b="50000"/>
+          </a:path>
+        </a:gradFill>
+      </a:bgFillStyleLst>
+    </a:fmtScheme>
+  </a:themeElements>
+  <a:objectDefaults>
+    <a:spDef>
+      <a:spPr/>
+      <a:bodyPr/>
+      <a:lstStyle/>
+      <a:style>
+        <a:lnRef idx="1">
+          <a:schemeClr val="accent1"/>
+        </a:lnRef>
+        <a:fillRef idx="3">
+          <a:schemeClr val="accent1"/>
+        </a:fillRef>
+        <a:effectRef idx="2">
+          <a:schemeClr val="accent1"/>
+        </a:effectRef>
+        <a:fontRef idx="minor">
+          <a:schemeClr val="lt1"/>
+        </a:fontRef>
+      </a:style>
+    </a:spDef>
+    <a:lnDef>
+      <a:spPr/>
+      <a:bodyPr/>
+      <a:lstStyle/>
+      <a:style>
+        <a:lnRef idx="2">
+          <a:schemeClr val="accent1"/>
+        </a:lnRef>
+        <a:fillRef idx="0">
+          <a:schemeClr val="accent1"/>
+        </a:fillRef>
+        <a:effectRef idx="1">
+          <a:schemeClr val="accent1"/>
+        </a:effectRef>
+        <a:fontRef idx="minor">
+          <a:schemeClr val="tx1"/>
+        </a:fontRef>
+      </a:style>
+    </a:lnDef>
+  </a:objectDefaults>
+  <a:extraClrSchemeLst/>
+</a:theme>
+</file>
+
+<file path=ppt/theme/theme4.xml><?xml version="1.0" encoding="utf-8"?>
+<a:theme xmlns:a="http://schemas.openxmlformats.org/drawingml/2006/main" name="Office Theme">
+  <a:themeElements>
+    <a:clrScheme name="Office">
+      <a:dk1>
+        <a:sysClr val="windowText" lastClr="000000"/>
+      </a:dk1>
+      <a:lt1>
+        <a:sysClr val="window" lastClr="FFFFFF"/>
+      </a:lt1>
+      <a:dk2>
+        <a:srgbClr val="1F497D"/>
+      </a:dk2>
+      <a:lt2>
+        <a:srgbClr val="EEECE1"/>
+      </a:lt2>
+      <a:accent1>
+        <a:srgbClr val="4F81BD"/>
+      </a:accent1>
+      <a:accent2>
+        <a:srgbClr val="C0504D"/>
+      </a:accent2>
+      <a:accent3>
+        <a:srgbClr val="9BBB59"/>
+      </a:accent3>
+      <a:accent4>
+        <a:srgbClr val="8064A2"/>
+      </a:accent4>
+      <a:accent5>
+        <a:srgbClr val="4BACC6"/>
+      </a:accent5>
+      <a:accent6>
+        <a:srgbClr val="F79646"/>
+      </a:accent6>
+      <a:hlink>
+        <a:srgbClr val="0000FF"/>
+      </a:hlink>
+      <a:folHlink>
+        <a:srgbClr val="800080"/>
+      </a:folHlink>
+    </a:clrScheme>
+    <a:fontScheme name="Office">
+      <a:majorFont>
+        <a:latin typeface="Calibri"/>
+        <a:ea typeface=""/>
+        <a:cs typeface=""/>
+        <a:font script="Jpan" typeface="ＭＳ Ｐゴシック"/>
+        <a:font script="Hang" typeface="맑은 고딕"/>
+        <a:font script="Hans" typeface="宋体"/>
+        <a:font script="Hant" typeface="新細明體"/>
+        <a:font script="Arab" typeface="Times New Roman"/>
+        <a:font script="Hebr" typeface="Times New Roman"/>
+        <a:font script="Thai" typeface="Angsana New"/>
+        <a:font script="Ethi" typeface="Nyala"/>
+        <a:font script="Beng" typeface="Vrinda"/>
+        <a:font script="Gujr" typeface="Shruti"/>
+        <a:font script="Khmr" typeface="MoolBoran"/>
+        <a:font script="Knda" typeface="Tunga"/>
+        <a:font script="Guru" typeface="Raavi"/>
+        <a:font script="Cans" typeface="Euphemia"/>
+        <a:font script="Cher" typeface="Plantagenet Cherokee"/>
+        <a:font script="Yiii" typeface="Microsoft Yi Baiti"/>
+        <a:font script="Tibt" typeface="Microsoft Himalaya"/>
+        <a:font script="Thaa" typeface="MV Boli"/>
+        <a:font script="Deva" typeface="Mangal"/>
+        <a:font script="Telu" typeface="Gautami"/>
+        <a:font script="Taml" typeface="Latha"/>
+        <a:font script="Syrc" typeface="Estrangelo Edessa"/>
+        <a:font script="Orya" typeface="Kalinga"/>
+        <a:font script="Mlym" typeface="Kartika"/>
+        <a:font script="Laoo" typeface="DokChampa"/>
+        <a:font script="Sinh" typeface="Iskoola Pota"/>
+        <a:font script="Mong" typeface="Mongolian Baiti"/>
+        <a:font script="Viet" typeface="Times New Roman"/>
+        <a:font script="Uigh" typeface="Microsoft Uighur"/>
+        <a:font script="Geor" typeface="Sylfaen"/>
+      </a:majorFont>
+      <a:minorFont>
+        <a:latin typeface="Calibri"/>
+        <a:ea typeface=""/>
+        <a:cs typeface=""/>
+        <a:font script="Jpan" typeface="ＭＳ Ｐゴシック"/>
+        <a:font script="Hang" typeface="맑은 고딕"/>
+        <a:font script="Hans" typeface="宋体"/>
+        <a:font script="Hant" typeface="新細明體"/>
+        <a:font script="Arab" typeface="Arial"/>
+        <a:font script="Hebr" typeface="Arial"/>
+        <a:font script="Thai" typeface="Cordia New"/>
+        <a:font script="Ethi" typeface="Nyala"/>
+        <a:font script="Beng" typeface="Vrinda"/>
+        <a:font script="Gujr" typeface="Shruti"/>
+        <a:font script="Khmr" typeface="DaunPenh"/>
+        <a:font script="Knda" typeface="Tunga"/>
+        <a:font script="Guru" typeface="Raavi"/>
+        <a:font script="Cans" typeface="Euphemia"/>
+        <a:font script="Cher" typeface="Plantagenet Cherokee"/>
+        <a:font script="Yiii" typeface="Microsoft Yi Baiti"/>
+        <a:font script="Tibt" typeface="Microsoft Himalaya"/>
+        <a:font script="Thaa" typeface="MV Boli"/>
+        <a:font script="Deva" typeface="Mangal"/>
+        <a:font script="Telu" typeface="Gautami"/>
+        <a:font script="Taml" typeface="Latha"/>
+        <a:font script="Syrc" typeface="Estrangelo Edessa"/>
+        <a:font script="Orya" typeface="Kalinga"/>
+        <a:font script="Mlym" typeface="Kartika"/>
+        <a:font script="Laoo" typeface="DokChampa"/>
+        <a:font script="Sinh" typeface="Iskoola Pota"/>
+        <a:font script="Mong" typeface="Mongolian Baiti"/>
+        <a:font script="Viet" typeface="Arial"/>
+        <a:font script="Uigh" typeface="Microsoft Uighur"/>
+        <a:font script="Geor" typeface="Sylfaen"/>
+      </a:minorFont>
+    </a:fontScheme>
+    <a:fmtScheme name="Office">
+      <a:fillStyleLst>
+        <a:solidFill>
+          <a:schemeClr val="phClr"/>
+        </a:solidFill>
+        <a:gradFill rotWithShape="1">
+          <a:gsLst>
+            <a:gs pos="0">
+              <a:schemeClr val="phClr">
+                <a:tint val="50000"/>
+                <a:satMod val="300000"/>
+              </a:schemeClr>
+            </a:gs>
+            <a:gs pos="35000">
+              <a:schemeClr val="phClr">
+                <a:tint val="37000"/>
+                <a:satMod val="300000"/>
+              </a:schemeClr>
+            </a:gs>
+            <a:gs pos="100000">
+              <a:schemeClr val="phClr">
+                <a:tint val="15000"/>
+                <a:satMod val="350000"/>
+              </a:schemeClr>
+            </a:gs>
+          </a:gsLst>
+          <a:lin ang="16200000" scaled="1"/>
+        </a:gradFill>
+        <a:gradFill rotWithShape="1">
+          <a:gsLst>
+            <a:gs pos="0">
+              <a:schemeClr val="phClr">
+                <a:tint val="100000"/>
+                <a:shade val="100000"/>
+                <a:satMod val="130000"/>
+              </a:schemeClr>
+            </a:gs>
+            <a:gs pos="100000">
+              <a:schemeClr val="phClr">
+                <a:tint val="50000"/>
+                <a:shade val="100000"/>
+                <a:satMod val="350000"/>
+              </a:schemeClr>
+            </a:gs>
+          </a:gsLst>
+          <a:lin ang="16200000" scaled="0"/>
+        </a:gradFill>
+      </a:fillStyleLst>
+      <a:lnStyleLst>
+        <a:ln w="9525" cap="flat" cmpd="sng" algn="ctr">
+          <a:solidFill>
+            <a:schemeClr val="phClr">
+              <a:shade val="95000"/>
+              <a:satMod val="105000"/>
+            </a:schemeClr>
+          </a:solidFill>
+          <a:prstDash val="solid"/>
+        </a:ln>
+        <a:ln w="25400" cap="flat" cmpd="sng" algn="ctr">
+          <a:solidFill>
+            <a:schemeClr val="phClr"/>
+          </a:solidFill>
+          <a:prstDash val="solid"/>
+        </a:ln>
+        <a:ln w="38100" cap="flat" cmpd="sng" algn="ctr">
+          <a:solidFill>
+            <a:schemeClr val="phClr"/>
+          </a:solidFill>
+          <a:prstDash val="solid"/>
+        </a:ln>
+      </a:lnStyleLst>
+      <a:effectStyleLst>
+        <a:effectStyle>
+          <a:effectLst>
+            <a:outerShdw blurRad="40000" dist="20000" dir="5400000" rotWithShape="0">
+              <a:srgbClr val="000000">
+                <a:alpha val="38000"/>
+              </a:srgbClr>
+            </a:outerShdw>
+          </a:effectLst>
+        </a:effectStyle>
+        <a:effectStyle>
+          <a:effectLst>
+            <a:outerShdw blurRad="40000" dist="23000" dir="5400000" rotWithShape="0">
+              <a:srgbClr val="000000">
+                <a:alpha val="35000"/>
+              </a:srgbClr>
+            </a:outerShdw>
+          </a:effectLst>
+        </a:effectStyle>
+        <a:effectStyle>
+          <a:effectLst>
+            <a:outerShdw blurRad="40000" dist="23000" dir="5400000" rotWithShape="0">
+              <a:srgbClr val="000000">
+                <a:alpha val="35000"/>
+              </a:srgbClr>
+            </a:outerShdw>
+          </a:effectLst>
+          <a:scene3d>
+            <a:camera prst="orthographicFront">
+              <a:rot lat="0" lon="0" rev="0"/>
+            </a:camera>
+            <a:lightRig rig="threePt" dir="t">
+              <a:rot lat="0" lon="0" rev="1200000"/>
+            </a:lightRig>
+          </a:scene3d>
+          <a:sp3d>
+            <a:bevelT w="63500" h="25400"/>
+          </a:sp3d>
+        </a:effectStyle>
+      </a:effectStyleLst>
+      <a:bgFillStyleLst>
+        <a:solidFill>
+          <a:schemeClr val="phClr"/>
+        </a:solidFill>
+        <a:gradFill rotWithShape="1">
+          <a:gsLst>
+            <a:gs pos="0">
+              <a:schemeClr val="phClr">
+                <a:tint val="40000"/>
+                <a:satMod val="350000"/>
+              </a:schemeClr>
+            </a:gs>
+            <a:gs pos="40000">
+              <a:schemeClr val="phClr">
+                <a:tint val="45000"/>
+                <a:shade val="99000"/>
+                <a:satMod val="350000"/>
+              </a:schemeClr>
+            </a:gs>
+            <a:gs pos="100000">
+              <a:schemeClr val="phClr">
+                <a:shade val="20000"/>
+                <a:satMod val="255000"/>
+              </a:schemeClr>
+            </a:gs>
+          </a:gsLst>
+          <a:path path="circle">
+            <a:fillToRect l="50000" t="-80000" r="50000" b="180000"/>
+          </a:path>
+        </a:gradFill>
+        <a:gradFill rotWithShape="1">
+          <a:gsLst>
+            <a:gs pos="0">
+              <a:schemeClr val="phClr">
+                <a:tint val="80000"/>
+                <a:satMod val="300000"/>
+              </a:schemeClr>
+            </a:gs>
+            <a:gs pos="100000">
+              <a:schemeClr val="phClr">
+                <a:shade val="30000"/>
+                <a:satMod val="200000"/>
+              </a:schemeClr>
+            </a:gs>
+          </a:gsLst>
+          <a:path path="circle">
+            <a:fillToRect l="50000" t="50000" r="50000" b="50000"/>
+          </a:path>
+        </a:gradFill>
+      </a:bgFillStyleLst>
+    </a:fmtScheme>
+  </a:themeElements>
+  <a:objectDefaults>
+    <a:spDef>
+      <a:spPr/>
+      <a:bodyPr/>
+      <a:lstStyle/>
+      <a:style>
+        <a:lnRef idx="1">
+          <a:schemeClr val="accent1"/>
+        </a:lnRef>
+        <a:fillRef idx="3">
+          <a:schemeClr val="accent1"/>
+        </a:fillRef>
+        <a:effectRef idx="2">
+          <a:schemeClr val="accent1"/>
+        </a:effectRef>
+        <a:fontRef idx="minor">
+          <a:schemeClr val="lt1"/>
+        </a:fontRef>
+      </a:style>
+    </a:spDef>
+    <a:lnDef>
+      <a:spPr/>
+      <a:bodyPr/>
+      <a:lstStyle/>
+      <a:style>
+        <a:lnRef idx="2">
+          <a:schemeClr val="accent1"/>
+        </a:lnRef>
+        <a:fillRef idx="0">
+          <a:schemeClr val="accent1"/>
+        </a:fillRef>
+        <a:effectRef idx="1">
+          <a:schemeClr val="accent1"/>
+        </a:effectRef>
+        <a:fontRef idx="minor">
+          <a:schemeClr val="tx1"/>
+        </a:fontRef>
+      </a:style>
+    </a:lnDef>
+  </a:objectDefaults>
+  <a:extraClrSchemeLst/>
+</a:theme>
 </file>
</xml_diff>